<commit_message>
uploading files modified in class
</commit_message>
<xml_diff>
--- a/Missouri Commuter Analysis.pptx
+++ b/Missouri Commuter Analysis.pptx
@@ -8,19 +8,20 @@
     <p:sldId id="256" r:id="rId2"/>
     <p:sldId id="258" r:id="rId3"/>
     <p:sldId id="257" r:id="rId4"/>
-    <p:sldId id="259" r:id="rId5"/>
-    <p:sldId id="260" r:id="rId6"/>
-    <p:sldId id="261" r:id="rId7"/>
-    <p:sldId id="262" r:id="rId8"/>
-    <p:sldId id="264" r:id="rId9"/>
-    <p:sldId id="265" r:id="rId10"/>
-    <p:sldId id="266" r:id="rId11"/>
-    <p:sldId id="267" r:id="rId12"/>
-    <p:sldId id="268" r:id="rId13"/>
-    <p:sldId id="269" r:id="rId14"/>
-    <p:sldId id="270" r:id="rId15"/>
-    <p:sldId id="271" r:id="rId16"/>
-    <p:sldId id="272" r:id="rId17"/>
+    <p:sldId id="266" r:id="rId5"/>
+    <p:sldId id="267" r:id="rId6"/>
+    <p:sldId id="273" r:id="rId7"/>
+    <p:sldId id="268" r:id="rId8"/>
+    <p:sldId id="271" r:id="rId9"/>
+    <p:sldId id="269" r:id="rId10"/>
+    <p:sldId id="259" r:id="rId11"/>
+    <p:sldId id="270" r:id="rId12"/>
+    <p:sldId id="272" r:id="rId13"/>
+    <p:sldId id="260" r:id="rId14"/>
+    <p:sldId id="261" r:id="rId15"/>
+    <p:sldId id="262" r:id="rId16"/>
+    <p:sldId id="264" r:id="rId17"/>
+    <p:sldId id="265" r:id="rId18"/>
   </p:sldIdLst>
   <p:sldSz cx="12192000" cy="6858000"/>
   <p:notesSz cx="6858000" cy="9144000"/>
@@ -6819,7 +6820,7 @@
           <p:cNvPr id="2" name="Title 1">
             <a:extLst>
               <a:ext uri="{FF2B5EF4-FFF2-40B4-BE49-F238E27FC236}">
-                <a16:creationId xmlns:a16="http://schemas.microsoft.com/office/drawing/2014/main" id="{7540248E-E715-4FFB-9952-2EB8BB3C1D4D}"/>
+                <a16:creationId xmlns:a16="http://schemas.microsoft.com/office/drawing/2014/main" id="{AE0F7C95-8B18-4770-B4EB-EFA7DEA3945C}"/>
               </a:ext>
             </a:extLst>
           </p:cNvPr>
@@ -6830,12 +6831,22 @@
             <p:ph type="title"/>
           </p:nvPr>
         </p:nvSpPr>
-        <p:spPr/>
-        <p:txBody>
-          <a:bodyPr/>
+        <p:spPr>
+          <a:xfrm>
+            <a:off x="1533831" y="365125"/>
+            <a:ext cx="9763433" cy="1325563"/>
+          </a:xfrm>
+        </p:spPr>
+        <p:txBody>
+          <a:bodyPr>
+            <a:normAutofit/>
+          </a:bodyPr>
           <a:lstStyle/>
           <a:p>
-            <a:endParaRPr lang="en-US"/>
+            <a:r>
+              <a:rPr lang="en-US" sz="4000" b="1" dirty="0"/>
+              <a:t>MSAs Analyzed</a:t>
+            </a:r>
           </a:p>
         </p:txBody>
       </p:sp>
@@ -6844,7 +6855,7 @@
           <p:cNvPr id="3" name="Content Placeholder 2">
             <a:extLst>
               <a:ext uri="{FF2B5EF4-FFF2-40B4-BE49-F238E27FC236}">
-                <a16:creationId xmlns:a16="http://schemas.microsoft.com/office/drawing/2014/main" id="{4EB8CA07-15E3-44DC-A0A8-5120AA5511F2}"/>
+                <a16:creationId xmlns:a16="http://schemas.microsoft.com/office/drawing/2014/main" id="{C26E86F2-BC11-4C17-8CF1-DCBE4A28DFE8}"/>
               </a:ext>
             </a:extLst>
           </p:cNvPr>
@@ -6855,19 +6866,533 @@
             <p:ph idx="1"/>
           </p:nvPr>
         </p:nvSpPr>
-        <p:spPr/>
-        <p:txBody>
-          <a:bodyPr/>
+        <p:spPr>
+          <a:xfrm>
+            <a:off x="1533832" y="1616390"/>
+            <a:ext cx="9438968" cy="4563122"/>
+          </a:xfrm>
+        </p:spPr>
+        <p:txBody>
+          <a:bodyPr numCol="3" spcCol="457200">
+            <a:noAutofit/>
+          </a:bodyPr>
           <a:lstStyle/>
           <a:p>
-            <a:endParaRPr lang="en-US"/>
+            <a:pPr marL="0" indent="0">
+              <a:buNone/>
+            </a:pPr>
+            <a:r>
+              <a:rPr lang="en-US" sz="1800" b="1" dirty="0"/>
+              <a:t>St. Louis</a:t>
+            </a:r>
+          </a:p>
+          <a:p>
+            <a:r>
+              <a:rPr lang="en-US" sz="1800" dirty="0"/>
+              <a:t>St. Louis City, MO</a:t>
+            </a:r>
+          </a:p>
+          <a:p>
+            <a:pPr>
+              <a:lnSpc>
+                <a:spcPct val="100000"/>
+              </a:lnSpc>
+              <a:spcBef>
+                <a:spcPts val="0"/>
+              </a:spcBef>
+            </a:pPr>
+            <a:r>
+              <a:rPr lang="en-US" sz="1800" dirty="0"/>
+              <a:t>St. Louis County, MO</a:t>
+            </a:r>
+          </a:p>
+          <a:p>
+            <a:pPr>
+              <a:lnSpc>
+                <a:spcPct val="100000"/>
+              </a:lnSpc>
+              <a:spcBef>
+                <a:spcPts val="0"/>
+              </a:spcBef>
+            </a:pPr>
+            <a:r>
+              <a:rPr lang="en-US" sz="1800" dirty="0"/>
+              <a:t>St. Charles County, MO</a:t>
+            </a:r>
+          </a:p>
+          <a:p>
+            <a:pPr>
+              <a:lnSpc>
+                <a:spcPct val="100000"/>
+              </a:lnSpc>
+              <a:spcBef>
+                <a:spcPts val="0"/>
+              </a:spcBef>
+            </a:pPr>
+            <a:r>
+              <a:rPr lang="en-US" sz="1800" dirty="0"/>
+              <a:t>Jefferson County, MO</a:t>
+            </a:r>
+          </a:p>
+          <a:p>
+            <a:pPr>
+              <a:lnSpc>
+                <a:spcPct val="100000"/>
+              </a:lnSpc>
+              <a:spcBef>
+                <a:spcPts val="0"/>
+              </a:spcBef>
+            </a:pPr>
+            <a:r>
+              <a:rPr lang="en-US" sz="1800" dirty="0"/>
+              <a:t>Franklin County, MO</a:t>
+            </a:r>
+          </a:p>
+          <a:p>
+            <a:pPr>
+              <a:lnSpc>
+                <a:spcPct val="100000"/>
+              </a:lnSpc>
+              <a:spcBef>
+                <a:spcPts val="0"/>
+              </a:spcBef>
+            </a:pPr>
+            <a:r>
+              <a:rPr lang="en-US" sz="1800" dirty="0"/>
+              <a:t>Lincoln County, MO</a:t>
+            </a:r>
+          </a:p>
+          <a:p>
+            <a:pPr>
+              <a:lnSpc>
+                <a:spcPct val="100000"/>
+              </a:lnSpc>
+              <a:spcBef>
+                <a:spcPts val="0"/>
+              </a:spcBef>
+            </a:pPr>
+            <a:r>
+              <a:rPr lang="en-US" sz="1800" dirty="0"/>
+              <a:t>Warren County, MO</a:t>
+            </a:r>
+          </a:p>
+          <a:p>
+            <a:pPr>
+              <a:lnSpc>
+                <a:spcPct val="100000"/>
+              </a:lnSpc>
+              <a:spcBef>
+                <a:spcPts val="0"/>
+              </a:spcBef>
+            </a:pPr>
+            <a:r>
+              <a:rPr lang="en-US" sz="1800" dirty="0"/>
+              <a:t>Madison County, IL</a:t>
+            </a:r>
+          </a:p>
+          <a:p>
+            <a:pPr>
+              <a:lnSpc>
+                <a:spcPct val="100000"/>
+              </a:lnSpc>
+              <a:spcBef>
+                <a:spcPts val="0"/>
+              </a:spcBef>
+            </a:pPr>
+            <a:r>
+              <a:rPr lang="en-US" sz="1800" dirty="0"/>
+              <a:t>St. Clair County, IL</a:t>
+            </a:r>
+          </a:p>
+          <a:p>
+            <a:pPr>
+              <a:lnSpc>
+                <a:spcPct val="100000"/>
+              </a:lnSpc>
+              <a:spcBef>
+                <a:spcPts val="0"/>
+              </a:spcBef>
+            </a:pPr>
+            <a:r>
+              <a:rPr lang="en-US" sz="1800" dirty="0"/>
+              <a:t>Clinton County, IL</a:t>
+            </a:r>
+          </a:p>
+          <a:p>
+            <a:pPr>
+              <a:lnSpc>
+                <a:spcPct val="100000"/>
+              </a:lnSpc>
+              <a:spcBef>
+                <a:spcPts val="0"/>
+              </a:spcBef>
+            </a:pPr>
+            <a:r>
+              <a:rPr lang="en-US" sz="1800" dirty="0"/>
+              <a:t>Monroe County, IL</a:t>
+            </a:r>
+          </a:p>
+          <a:p>
+            <a:pPr>
+              <a:lnSpc>
+                <a:spcPct val="100000"/>
+              </a:lnSpc>
+              <a:spcBef>
+                <a:spcPts val="0"/>
+              </a:spcBef>
+            </a:pPr>
+            <a:r>
+              <a:rPr lang="en-US" sz="1800" dirty="0"/>
+              <a:t>Jersey County, IL</a:t>
+            </a:r>
+          </a:p>
+          <a:p>
+            <a:pPr>
+              <a:lnSpc>
+                <a:spcPct val="120000"/>
+              </a:lnSpc>
+              <a:spcBef>
+                <a:spcPts val="600"/>
+              </a:spcBef>
+            </a:pPr>
+            <a:endParaRPr lang="en-US" sz="1800" dirty="0"/>
+          </a:p>
+          <a:p>
+            <a:pPr>
+              <a:lnSpc>
+                <a:spcPct val="120000"/>
+              </a:lnSpc>
+              <a:spcBef>
+                <a:spcPts val="600"/>
+              </a:spcBef>
+            </a:pPr>
+            <a:endParaRPr lang="en-US" sz="1800" dirty="0"/>
+          </a:p>
+          <a:p>
+            <a:pPr marL="0" indent="0">
+              <a:lnSpc>
+                <a:spcPct val="120000"/>
+              </a:lnSpc>
+              <a:spcBef>
+                <a:spcPts val="600"/>
+              </a:spcBef>
+              <a:buNone/>
+            </a:pPr>
+            <a:r>
+              <a:rPr lang="en-US" sz="1800" b="1" dirty="0"/>
+              <a:t>Kansas City</a:t>
+            </a:r>
+            <a:endParaRPr lang="en-US" sz="1800" dirty="0"/>
+          </a:p>
+          <a:p>
+            <a:pPr>
+              <a:lnSpc>
+                <a:spcPct val="100000"/>
+              </a:lnSpc>
+              <a:spcBef>
+                <a:spcPts val="0"/>
+              </a:spcBef>
+            </a:pPr>
+            <a:r>
+              <a:rPr lang="en-US" sz="1800" dirty="0"/>
+              <a:t>Bates County, MO</a:t>
+            </a:r>
+          </a:p>
+          <a:p>
+            <a:pPr>
+              <a:lnSpc>
+                <a:spcPct val="100000"/>
+              </a:lnSpc>
+              <a:spcBef>
+                <a:spcPts val="0"/>
+              </a:spcBef>
+            </a:pPr>
+            <a:r>
+              <a:rPr lang="en-US" sz="1800" dirty="0"/>
+              <a:t>Caldwell County, MO</a:t>
+            </a:r>
+          </a:p>
+          <a:p>
+            <a:pPr>
+              <a:lnSpc>
+                <a:spcPct val="100000"/>
+              </a:lnSpc>
+              <a:spcBef>
+                <a:spcPts val="0"/>
+              </a:spcBef>
+            </a:pPr>
+            <a:r>
+              <a:rPr lang="en-US" sz="1800" dirty="0"/>
+              <a:t>Cass County, MO</a:t>
+            </a:r>
+          </a:p>
+          <a:p>
+            <a:pPr>
+              <a:lnSpc>
+                <a:spcPct val="100000"/>
+              </a:lnSpc>
+              <a:spcBef>
+                <a:spcPts val="0"/>
+              </a:spcBef>
+            </a:pPr>
+            <a:r>
+              <a:rPr lang="en-US" sz="1800" dirty="0"/>
+              <a:t>Clay County, MO</a:t>
+            </a:r>
+          </a:p>
+          <a:p>
+            <a:pPr>
+              <a:lnSpc>
+                <a:spcPct val="100000"/>
+              </a:lnSpc>
+              <a:spcBef>
+                <a:spcPts val="0"/>
+              </a:spcBef>
+            </a:pPr>
+            <a:r>
+              <a:rPr lang="en-US" sz="1800" dirty="0"/>
+              <a:t>Clinton County, MO</a:t>
+            </a:r>
+          </a:p>
+          <a:p>
+            <a:pPr>
+              <a:lnSpc>
+                <a:spcPct val="100000"/>
+              </a:lnSpc>
+              <a:spcBef>
+                <a:spcPts val="0"/>
+              </a:spcBef>
+            </a:pPr>
+            <a:r>
+              <a:rPr lang="en-US" sz="1800" dirty="0"/>
+              <a:t>Jackson County, MO</a:t>
+            </a:r>
+          </a:p>
+          <a:p>
+            <a:pPr>
+              <a:lnSpc>
+                <a:spcPct val="100000"/>
+              </a:lnSpc>
+              <a:spcBef>
+                <a:spcPts val="0"/>
+              </a:spcBef>
+            </a:pPr>
+            <a:r>
+              <a:rPr lang="en-US" sz="1800" dirty="0"/>
+              <a:t>Lafayette County, MO</a:t>
+            </a:r>
+          </a:p>
+          <a:p>
+            <a:pPr>
+              <a:lnSpc>
+                <a:spcPct val="100000"/>
+              </a:lnSpc>
+              <a:spcBef>
+                <a:spcPts val="0"/>
+              </a:spcBef>
+            </a:pPr>
+            <a:r>
+              <a:rPr lang="en-US" sz="1800" dirty="0"/>
+              <a:t>Platte County, MO</a:t>
+            </a:r>
+          </a:p>
+          <a:p>
+            <a:pPr>
+              <a:lnSpc>
+                <a:spcPct val="100000"/>
+              </a:lnSpc>
+              <a:spcBef>
+                <a:spcPts val="0"/>
+              </a:spcBef>
+            </a:pPr>
+            <a:r>
+              <a:rPr lang="en-US" sz="1800" dirty="0"/>
+              <a:t>Ray County, MO</a:t>
+            </a:r>
+          </a:p>
+          <a:p>
+            <a:pPr>
+              <a:lnSpc>
+                <a:spcPct val="100000"/>
+              </a:lnSpc>
+              <a:spcBef>
+                <a:spcPts val="0"/>
+              </a:spcBef>
+            </a:pPr>
+            <a:r>
+              <a:rPr lang="en-US" sz="1800" dirty="0"/>
+              <a:t>Johnson County, KS</a:t>
+            </a:r>
+          </a:p>
+          <a:p>
+            <a:pPr>
+              <a:lnSpc>
+                <a:spcPct val="100000"/>
+              </a:lnSpc>
+              <a:spcBef>
+                <a:spcPts val="0"/>
+              </a:spcBef>
+            </a:pPr>
+            <a:r>
+              <a:rPr lang="en-US" sz="1800" dirty="0"/>
+              <a:t>Leavenworth County, KS</a:t>
+            </a:r>
+          </a:p>
+          <a:p>
+            <a:pPr>
+              <a:lnSpc>
+                <a:spcPct val="100000"/>
+              </a:lnSpc>
+              <a:spcBef>
+                <a:spcPts val="0"/>
+              </a:spcBef>
+            </a:pPr>
+            <a:r>
+              <a:rPr lang="en-US" sz="1800" dirty="0"/>
+              <a:t>Linn County, KS</a:t>
+            </a:r>
+          </a:p>
+          <a:p>
+            <a:pPr>
+              <a:lnSpc>
+                <a:spcPct val="100000"/>
+              </a:lnSpc>
+              <a:spcBef>
+                <a:spcPts val="0"/>
+              </a:spcBef>
+            </a:pPr>
+            <a:r>
+              <a:rPr lang="en-US" sz="1800" dirty="0"/>
+              <a:t>Miami County, KS</a:t>
+            </a:r>
+          </a:p>
+          <a:p>
+            <a:pPr>
+              <a:lnSpc>
+                <a:spcPct val="100000"/>
+              </a:lnSpc>
+              <a:spcBef>
+                <a:spcPts val="0"/>
+              </a:spcBef>
+            </a:pPr>
+            <a:r>
+              <a:rPr lang="en-US" sz="1800" dirty="0"/>
+              <a:t>Wyandotte County, KS</a:t>
+            </a:r>
+          </a:p>
+          <a:p>
+            <a:pPr marL="236538" indent="-236538">
+              <a:lnSpc>
+                <a:spcPct val="120000"/>
+              </a:lnSpc>
+              <a:spcBef>
+                <a:spcPts val="600"/>
+              </a:spcBef>
+              <a:buNone/>
+              <a:tabLst>
+                <a:tab pos="341313" algn="l"/>
+              </a:tabLst>
+            </a:pPr>
+            <a:r>
+              <a:rPr lang="en-US" sz="1800" b="1" dirty="0"/>
+              <a:t>Springfield</a:t>
+            </a:r>
+            <a:endParaRPr lang="en-US" sz="1800" dirty="0"/>
+          </a:p>
+          <a:p>
+            <a:pPr marL="236538" indent="-236538">
+              <a:lnSpc>
+                <a:spcPct val="100000"/>
+              </a:lnSpc>
+              <a:spcBef>
+                <a:spcPts val="0"/>
+              </a:spcBef>
+              <a:tabLst>
+                <a:tab pos="230188" algn="l"/>
+              </a:tabLst>
+            </a:pPr>
+            <a:r>
+              <a:rPr lang="en-US" sz="1800" dirty="0"/>
+              <a:t>Greene County, MO</a:t>
+            </a:r>
+          </a:p>
+          <a:p>
+            <a:pPr marL="236538" indent="-236538">
+              <a:lnSpc>
+                <a:spcPct val="100000"/>
+              </a:lnSpc>
+              <a:spcBef>
+                <a:spcPts val="0"/>
+              </a:spcBef>
+              <a:tabLst>
+                <a:tab pos="230188" algn="l"/>
+              </a:tabLst>
+            </a:pPr>
+            <a:r>
+              <a:rPr lang="en-US" sz="1800" dirty="0"/>
+              <a:t>Christian County, MO</a:t>
+            </a:r>
+          </a:p>
+          <a:p>
+            <a:pPr marL="236538" indent="-236538">
+              <a:lnSpc>
+                <a:spcPct val="100000"/>
+              </a:lnSpc>
+              <a:spcBef>
+                <a:spcPts val="0"/>
+              </a:spcBef>
+              <a:tabLst>
+                <a:tab pos="230188" algn="l"/>
+              </a:tabLst>
+            </a:pPr>
+            <a:r>
+              <a:rPr lang="en-US" sz="1800" dirty="0"/>
+              <a:t>Webster County, MO</a:t>
+            </a:r>
+          </a:p>
+          <a:p>
+            <a:pPr marL="236538" indent="-236538">
+              <a:lnSpc>
+                <a:spcPct val="100000"/>
+              </a:lnSpc>
+              <a:spcBef>
+                <a:spcPts val="0"/>
+              </a:spcBef>
+              <a:tabLst>
+                <a:tab pos="230188" algn="l"/>
+              </a:tabLst>
+            </a:pPr>
+            <a:r>
+              <a:rPr lang="en-US" sz="1800" dirty="0"/>
+              <a:t>Polk County, MO</a:t>
+            </a:r>
+          </a:p>
+          <a:p>
+            <a:pPr marL="236538" indent="-236538">
+              <a:lnSpc>
+                <a:spcPct val="100000"/>
+              </a:lnSpc>
+              <a:spcBef>
+                <a:spcPts val="0"/>
+              </a:spcBef>
+              <a:tabLst>
+                <a:tab pos="230188" algn="l"/>
+              </a:tabLst>
+            </a:pPr>
+            <a:r>
+              <a:rPr lang="en-US" sz="1800" dirty="0"/>
+              <a:t>Dallas County, MO</a:t>
+            </a:r>
+          </a:p>
+          <a:p>
+            <a:endParaRPr lang="en-US" sz="1400" dirty="0"/>
           </a:p>
         </p:txBody>
       </p:sp>
     </p:spTree>
     <p:extLst>
       <p:ext uri="{BB962C8B-B14F-4D97-AF65-F5344CB8AC3E}">
-        <p14:creationId xmlns:p14="http://schemas.microsoft.com/office/powerpoint/2010/main" val="3239497900"/>
+        <p14:creationId xmlns:p14="http://schemas.microsoft.com/office/powerpoint/2010/main" val="1842607254"/>
       </p:ext>
     </p:extLst>
   </p:cSld>
@@ -6896,10 +7421,10 @@
       </p:grpSpPr>
       <p:sp>
         <p:nvSpPr>
-          <p:cNvPr id="2" name="Title 1">
-            <a:extLst>
-              <a:ext uri="{FF2B5EF4-FFF2-40B4-BE49-F238E27FC236}">
-                <a16:creationId xmlns:a16="http://schemas.microsoft.com/office/drawing/2014/main" id="{B5D0FC5E-A58A-4472-8073-7CFD303508D2}"/>
+          <p:cNvPr id="11" name="Title 10">
+            <a:extLst>
+              <a:ext uri="{FF2B5EF4-FFF2-40B4-BE49-F238E27FC236}">
+                <a16:creationId xmlns:a16="http://schemas.microsoft.com/office/drawing/2014/main" id="{6C661A37-4510-4D74-9917-3CBF65FA5E54}"/>
               </a:ext>
             </a:extLst>
           </p:cNvPr>
@@ -6915,24 +7440,27 @@
           <a:bodyPr/>
           <a:lstStyle/>
           <a:p>
-            <a:endParaRPr lang="en-US"/>
-          </a:p>
-        </p:txBody>
-      </p:sp>
-      <p:sp>
-        <p:nvSpPr>
-          <p:cNvPr id="3" name="Content Placeholder 2">
-            <a:extLst>
-              <a:ext uri="{FF2B5EF4-FFF2-40B4-BE49-F238E27FC236}">
-                <a16:creationId xmlns:a16="http://schemas.microsoft.com/office/drawing/2014/main" id="{BA11E7FD-50A6-4480-8C7A-370A1D464BBB}"/>
-              </a:ext>
-            </a:extLst>
-          </p:cNvPr>
-          <p:cNvSpPr>
-            <a:spLocks noGrp="1"/>
-          </p:cNvSpPr>
-          <p:nvPr>
-            <p:ph idx="1"/>
+            <a:r>
+              <a:rPr lang="en-US" dirty="0"/>
+              <a:t>MSA Analysis</a:t>
+            </a:r>
+          </a:p>
+        </p:txBody>
+      </p:sp>
+      <p:sp>
+        <p:nvSpPr>
+          <p:cNvPr id="13" name="Text Placeholder 12">
+            <a:extLst>
+              <a:ext uri="{FF2B5EF4-FFF2-40B4-BE49-F238E27FC236}">
+                <a16:creationId xmlns:a16="http://schemas.microsoft.com/office/drawing/2014/main" id="{ECC610BC-D68E-4742-B34D-ECB341F66D20}"/>
+              </a:ext>
+            </a:extLst>
+          </p:cNvPr>
+          <p:cNvSpPr>
+            <a:spLocks noGrp="1"/>
+          </p:cNvSpPr>
+          <p:nvPr>
+            <p:ph type="body" sz="half" idx="2"/>
           </p:nvPr>
         </p:nvSpPr>
         <p:spPr/>
@@ -6944,10 +7472,59 @@
           </a:p>
         </p:txBody>
       </p:sp>
+      <p:pic>
+        <p:nvPicPr>
+          <p:cNvPr id="1026" name="Picture 2">
+            <a:extLst>
+              <a:ext uri="{FF2B5EF4-FFF2-40B4-BE49-F238E27FC236}">
+                <a16:creationId xmlns:a16="http://schemas.microsoft.com/office/drawing/2014/main" id="{B548E009-70A7-4A4B-A579-3566E6AE6B9F}"/>
+              </a:ext>
+            </a:extLst>
+          </p:cNvPr>
+          <p:cNvPicPr>
+            <a:picLocks noGrp="1" noChangeAspect="1" noChangeArrowheads="1"/>
+          </p:cNvPicPr>
+          <p:nvPr>
+            <p:ph idx="1"/>
+          </p:nvPr>
+        </p:nvPicPr>
+        <p:blipFill>
+          <a:blip r:embed="rId2">
+            <a:extLst>
+              <a:ext uri="{28A0092B-C50C-407E-A947-70E740481C1C}">
+                <a14:useLocalDpi xmlns:a14="http://schemas.microsoft.com/office/drawing/2010/main" val="0"/>
+              </a:ext>
+            </a:extLst>
+          </a:blip>
+          <a:srcRect/>
+          <a:stretch>
+            <a:fillRect/>
+          </a:stretch>
+        </p:blipFill>
+        <p:spPr bwMode="auto">
+          <a:xfrm>
+            <a:off x="5248455" y="1645832"/>
+            <a:ext cx="5386027" cy="3556810"/>
+          </a:xfrm>
+          <a:prstGeom prst="rect">
+            <a:avLst/>
+          </a:prstGeom>
+          <a:noFill/>
+          <a:extLst>
+            <a:ext uri="{909E8E84-426E-40DD-AFC4-6F175D3DCCD1}">
+              <a14:hiddenFill xmlns:a14="http://schemas.microsoft.com/office/drawing/2010/main">
+                <a:solidFill>
+                  <a:srgbClr val="FFFFFF"/>
+                </a:solidFill>
+              </a14:hiddenFill>
+            </a:ext>
+          </a:extLst>
+        </p:spPr>
+      </p:pic>
     </p:spTree>
     <p:extLst>
       <p:ext uri="{BB962C8B-B14F-4D97-AF65-F5344CB8AC3E}">
-        <p14:creationId xmlns:p14="http://schemas.microsoft.com/office/powerpoint/2010/main" val="4139403711"/>
+        <p14:creationId xmlns:p14="http://schemas.microsoft.com/office/powerpoint/2010/main" val="2732392241"/>
       </p:ext>
     </p:extLst>
   </p:cSld>
@@ -6979,7 +7556,7 @@
           <p:cNvPr id="2" name="Title 1">
             <a:extLst>
               <a:ext uri="{FF2B5EF4-FFF2-40B4-BE49-F238E27FC236}">
-                <a16:creationId xmlns:a16="http://schemas.microsoft.com/office/drawing/2014/main" id="{2F013819-0358-4800-A10B-6A73E73B8CFA}"/>
+                <a16:creationId xmlns:a16="http://schemas.microsoft.com/office/drawing/2014/main" id="{0D745AD3-9A89-4DBF-A4D1-C2722CB2B0F8}"/>
               </a:ext>
             </a:extLst>
           </p:cNvPr>
@@ -7004,7 +7581,7 @@
           <p:cNvPr id="3" name="Content Placeholder 2">
             <a:extLst>
               <a:ext uri="{FF2B5EF4-FFF2-40B4-BE49-F238E27FC236}">
-                <a16:creationId xmlns:a16="http://schemas.microsoft.com/office/drawing/2014/main" id="{C2A6475D-AA54-44F2-A6CD-99A20FEFE1BB}"/>
+                <a16:creationId xmlns:a16="http://schemas.microsoft.com/office/drawing/2014/main" id="{A2D72E4D-D08D-4A14-8699-5F2E6F77D779}"/>
               </a:ext>
             </a:extLst>
           </p:cNvPr>
@@ -7027,7 +7604,7 @@
     </p:spTree>
     <p:extLst>
       <p:ext uri="{BB962C8B-B14F-4D97-AF65-F5344CB8AC3E}">
-        <p14:creationId xmlns:p14="http://schemas.microsoft.com/office/powerpoint/2010/main" val="4119927468"/>
+        <p14:creationId xmlns:p14="http://schemas.microsoft.com/office/powerpoint/2010/main" val="3428998072"/>
       </p:ext>
     </p:extLst>
   </p:cSld>
@@ -7059,7 +7636,7 @@
           <p:cNvPr id="2" name="Title 1">
             <a:extLst>
               <a:ext uri="{FF2B5EF4-FFF2-40B4-BE49-F238E27FC236}">
-                <a16:creationId xmlns:a16="http://schemas.microsoft.com/office/drawing/2014/main" id="{824D4802-761B-44E4-87AF-2979CE3F64EC}"/>
+                <a16:creationId xmlns:a16="http://schemas.microsoft.com/office/drawing/2014/main" id="{5888785A-D677-45F8-9A8E-01CFAD384C68}"/>
               </a:ext>
             </a:extLst>
           </p:cNvPr>
@@ -7068,6 +7645,41 @@
           </p:cNvSpPr>
           <p:nvPr>
             <p:ph type="title"/>
+          </p:nvPr>
+        </p:nvSpPr>
+        <p:spPr>
+          <a:xfrm>
+            <a:off x="1533832" y="393291"/>
+            <a:ext cx="9153833" cy="1278194"/>
+          </a:xfrm>
+        </p:spPr>
+        <p:txBody>
+          <a:bodyPr>
+            <a:normAutofit/>
+          </a:bodyPr>
+          <a:lstStyle/>
+          <a:p>
+            <a:r>
+              <a:rPr lang="en-US" dirty="0"/>
+              <a:t>Solo Commuters</a:t>
+            </a:r>
+          </a:p>
+        </p:txBody>
+      </p:sp>
+      <p:sp>
+        <p:nvSpPr>
+          <p:cNvPr id="3" name="Content Placeholder 2">
+            <a:extLst>
+              <a:ext uri="{FF2B5EF4-FFF2-40B4-BE49-F238E27FC236}">
+                <a16:creationId xmlns:a16="http://schemas.microsoft.com/office/drawing/2014/main" id="{B6C6D485-D2CA-4D75-AA14-689F672BF597}"/>
+              </a:ext>
+            </a:extLst>
+          </p:cNvPr>
+          <p:cNvSpPr>
+            <a:spLocks noGrp="1"/>
+          </p:cNvSpPr>
+          <p:nvPr>
+            <p:ph idx="1"/>
           </p:nvPr>
         </p:nvSpPr>
         <p:spPr/>
@@ -7079,35 +7691,54 @@
           </a:p>
         </p:txBody>
       </p:sp>
-      <p:sp>
-        <p:nvSpPr>
-          <p:cNvPr id="3" name="Content Placeholder 2">
-            <a:extLst>
-              <a:ext uri="{FF2B5EF4-FFF2-40B4-BE49-F238E27FC236}">
-                <a16:creationId xmlns:a16="http://schemas.microsoft.com/office/drawing/2014/main" id="{E1796F22-021F-49BB-8F18-0D9DD8629605}"/>
-              </a:ext>
-            </a:extLst>
-          </p:cNvPr>
-          <p:cNvSpPr>
-            <a:spLocks noGrp="1"/>
-          </p:cNvSpPr>
-          <p:nvPr>
-            <p:ph idx="1"/>
-          </p:nvPr>
-        </p:nvSpPr>
-        <p:spPr/>
-        <p:txBody>
-          <a:bodyPr/>
-          <a:lstStyle/>
-          <a:p>
-            <a:endParaRPr lang="en-US"/>
-          </a:p>
-        </p:txBody>
-      </p:sp>
+      <p:pic>
+        <p:nvPicPr>
+          <p:cNvPr id="8" name="Picture 7">
+            <a:extLst>
+              <a:ext uri="{FF2B5EF4-FFF2-40B4-BE49-F238E27FC236}">
+                <a16:creationId xmlns:a16="http://schemas.microsoft.com/office/drawing/2014/main" id="{87FA2B47-7C08-4097-8ADD-BFD4D01FA4E2}"/>
+              </a:ext>
+            </a:extLst>
+          </p:cNvPr>
+          <p:cNvPicPr>
+            <a:picLocks noChangeAspect="1"/>
+          </p:cNvPicPr>
+          <p:nvPr/>
+        </p:nvPicPr>
+        <p:blipFill>
+          <a:blip r:embed="rId2">
+            <a:duotone>
+              <a:schemeClr val="accent5">
+                <a:shade val="45000"/>
+                <a:satMod val="135000"/>
+              </a:schemeClr>
+              <a:prstClr val="white"/>
+            </a:duotone>
+            <a:alphaModFix/>
+            <a:extLst>
+              <a:ext uri="{28A0092B-C50C-407E-A947-70E740481C1C}">
+                <a14:useLocalDpi xmlns:a14="http://schemas.microsoft.com/office/drawing/2010/main" val="0"/>
+              </a:ext>
+            </a:extLst>
+          </a:blip>
+          <a:stretch>
+            <a:fillRect/>
+          </a:stretch>
+        </p:blipFill>
+        <p:spPr>
+          <a:xfrm>
+            <a:off x="330530" y="1013916"/>
+            <a:ext cx="785829" cy="658861"/>
+          </a:xfrm>
+          <a:prstGeom prst="rect">
+            <a:avLst/>
+          </a:prstGeom>
+        </p:spPr>
+      </p:pic>
     </p:spTree>
     <p:extLst>
       <p:ext uri="{BB962C8B-B14F-4D97-AF65-F5344CB8AC3E}">
-        <p14:creationId xmlns:p14="http://schemas.microsoft.com/office/powerpoint/2010/main" val="2074632626"/>
+        <p14:creationId xmlns:p14="http://schemas.microsoft.com/office/powerpoint/2010/main" val="3157146832"/>
       </p:ext>
     </p:extLst>
   </p:cSld>
@@ -7139,7 +7770,7 @@
           <p:cNvPr id="2" name="Title 1">
             <a:extLst>
               <a:ext uri="{FF2B5EF4-FFF2-40B4-BE49-F238E27FC236}">
-                <a16:creationId xmlns:a16="http://schemas.microsoft.com/office/drawing/2014/main" id="{271A0E63-FDDD-44E2-8A99-18154D684725}"/>
+                <a16:creationId xmlns:a16="http://schemas.microsoft.com/office/drawing/2014/main" id="{E8EE8BAA-BB1D-4C31-8A63-059AF36583C0}"/>
               </a:ext>
             </a:extLst>
           </p:cNvPr>
@@ -7150,12 +7781,20 @@
             <p:ph type="title"/>
           </p:nvPr>
         </p:nvSpPr>
-        <p:spPr/>
+        <p:spPr>
+          <a:xfrm>
+            <a:off x="1533832" y="365125"/>
+            <a:ext cx="9153833" cy="1316191"/>
+          </a:xfrm>
+        </p:spPr>
         <p:txBody>
           <a:bodyPr/>
           <a:lstStyle/>
           <a:p>
-            <a:endParaRPr lang="en-US"/>
+            <a:r>
+              <a:rPr lang="en-US" dirty="0"/>
+              <a:t>Carpoolers</a:t>
+            </a:r>
           </a:p>
         </p:txBody>
       </p:sp>
@@ -7164,7 +7803,7 @@
           <p:cNvPr id="3" name="Content Placeholder 2">
             <a:extLst>
               <a:ext uri="{FF2B5EF4-FFF2-40B4-BE49-F238E27FC236}">
-                <a16:creationId xmlns:a16="http://schemas.microsoft.com/office/drawing/2014/main" id="{84DACFE6-0AA9-42AE-B1DD-1511B9CC4A94}"/>
+                <a16:creationId xmlns:a16="http://schemas.microsoft.com/office/drawing/2014/main" id="{C7356092-B8A3-4539-85D3-6F6EF835CF93}"/>
               </a:ext>
             </a:extLst>
           </p:cNvPr>
@@ -7184,10 +7823,54 @@
           </a:p>
         </p:txBody>
       </p:sp>
+      <p:pic>
+        <p:nvPicPr>
+          <p:cNvPr id="7" name="Picture 6">
+            <a:extLst>
+              <a:ext uri="{FF2B5EF4-FFF2-40B4-BE49-F238E27FC236}">
+                <a16:creationId xmlns:a16="http://schemas.microsoft.com/office/drawing/2014/main" id="{6379E98B-471A-40BE-ADDD-3EE87B718E00}"/>
+              </a:ext>
+            </a:extLst>
+          </p:cNvPr>
+          <p:cNvPicPr>
+            <a:picLocks noChangeAspect="1"/>
+          </p:cNvPicPr>
+          <p:nvPr/>
+        </p:nvPicPr>
+        <p:blipFill>
+          <a:blip r:embed="rId2">
+            <a:duotone>
+              <a:schemeClr val="accent5">
+                <a:shade val="45000"/>
+                <a:satMod val="135000"/>
+              </a:schemeClr>
+              <a:prstClr val="white"/>
+            </a:duotone>
+            <a:alphaModFix/>
+            <a:extLst>
+              <a:ext uri="{28A0092B-C50C-407E-A947-70E740481C1C}">
+                <a14:useLocalDpi xmlns:a14="http://schemas.microsoft.com/office/drawing/2010/main" val="0"/>
+              </a:ext>
+            </a:extLst>
+          </a:blip>
+          <a:stretch>
+            <a:fillRect/>
+          </a:stretch>
+        </p:blipFill>
+        <p:spPr>
+          <a:xfrm>
+            <a:off x="330530" y="1901976"/>
+            <a:ext cx="897724" cy="751699"/>
+          </a:xfrm>
+          <a:prstGeom prst="rect">
+            <a:avLst/>
+          </a:prstGeom>
+        </p:spPr>
+      </p:pic>
     </p:spTree>
     <p:extLst>
       <p:ext uri="{BB962C8B-B14F-4D97-AF65-F5344CB8AC3E}">
-        <p14:creationId xmlns:p14="http://schemas.microsoft.com/office/powerpoint/2010/main" val="2732392241"/>
+        <p14:creationId xmlns:p14="http://schemas.microsoft.com/office/powerpoint/2010/main" val="795467078"/>
       </p:ext>
     </p:extLst>
   </p:cSld>
@@ -7219,7 +7902,7 @@
           <p:cNvPr id="2" name="Title 1">
             <a:extLst>
               <a:ext uri="{FF2B5EF4-FFF2-40B4-BE49-F238E27FC236}">
-                <a16:creationId xmlns:a16="http://schemas.microsoft.com/office/drawing/2014/main" id="{90BBDCC0-6086-4C55-853A-FD209F4D2E91}"/>
+                <a16:creationId xmlns:a16="http://schemas.microsoft.com/office/drawing/2014/main" id="{2B986B38-EDB0-4229-8D71-F960F7D05BC9}"/>
               </a:ext>
             </a:extLst>
           </p:cNvPr>
@@ -7235,7 +7918,10 @@
           <a:bodyPr/>
           <a:lstStyle/>
           <a:p>
-            <a:endParaRPr lang="en-US"/>
+            <a:r>
+              <a:rPr lang="en-US" dirty="0"/>
+              <a:t>Public Transit</a:t>
+            </a:r>
           </a:p>
         </p:txBody>
       </p:sp>
@@ -7244,7 +7930,7 @@
           <p:cNvPr id="3" name="Content Placeholder 2">
             <a:extLst>
               <a:ext uri="{FF2B5EF4-FFF2-40B4-BE49-F238E27FC236}">
-                <a16:creationId xmlns:a16="http://schemas.microsoft.com/office/drawing/2014/main" id="{BC52D307-3D4C-4049-BDFC-7905B2E1F634}"/>
+                <a16:creationId xmlns:a16="http://schemas.microsoft.com/office/drawing/2014/main" id="{B5C25182-F4DE-494E-BEFF-FE4D64D14941}"/>
               </a:ext>
             </a:extLst>
           </p:cNvPr>
@@ -7264,10 +7950,109 @@
           </a:p>
         </p:txBody>
       </p:sp>
+      <p:pic>
+        <p:nvPicPr>
+          <p:cNvPr id="5" name="Picture 2" descr="Related image">
+            <a:hlinkClick r:id="rId2"/>
+            <a:extLst>
+              <a:ext uri="{FF2B5EF4-FFF2-40B4-BE49-F238E27FC236}">
+                <a16:creationId xmlns:a16="http://schemas.microsoft.com/office/drawing/2014/main" id="{4983EE56-BAED-474D-9D79-808886360B0B}"/>
+              </a:ext>
+            </a:extLst>
+          </p:cNvPr>
+          <p:cNvPicPr>
+            <a:picLocks noChangeAspect="1" noChangeArrowheads="1"/>
+          </p:cNvPicPr>
+          <p:nvPr/>
+        </p:nvPicPr>
+        <p:blipFill>
+          <a:blip r:embed="rId3">
+            <a:duotone>
+              <a:schemeClr val="accent5">
+                <a:shade val="45000"/>
+                <a:satMod val="135000"/>
+              </a:schemeClr>
+              <a:prstClr val="white"/>
+            </a:duotone>
+            <a:alphaModFix/>
+            <a:extLst>
+              <a:ext uri="{28A0092B-C50C-407E-A947-70E740481C1C}">
+                <a14:useLocalDpi xmlns:a14="http://schemas.microsoft.com/office/drawing/2010/main" val="0"/>
+              </a:ext>
+            </a:extLst>
+          </a:blip>
+          <a:srcRect/>
+          <a:stretch>
+            <a:fillRect/>
+          </a:stretch>
+        </p:blipFill>
+        <p:spPr bwMode="auto">
+          <a:xfrm>
+            <a:off x="339766" y="2928309"/>
+            <a:ext cx="749940" cy="802019"/>
+          </a:xfrm>
+          <a:prstGeom prst="rect">
+            <a:avLst/>
+          </a:prstGeom>
+          <a:noFill/>
+          <a:extLst>
+            <a:ext uri="{909E8E84-426E-40DD-AFC4-6F175D3DCCD1}">
+              <a14:hiddenFill xmlns:a14="http://schemas.microsoft.com/office/drawing/2010/main">
+                <a:solidFill>
+                  <a:srgbClr val="FFFFFF"/>
+                </a:solidFill>
+              </a14:hiddenFill>
+            </a:ext>
+          </a:extLst>
+        </p:spPr>
+      </p:pic>
+      <p:pic>
+        <p:nvPicPr>
+          <p:cNvPr id="9" name="Picture 8">
+            <a:extLst>
+              <a:ext uri="{FF2B5EF4-FFF2-40B4-BE49-F238E27FC236}">
+                <a16:creationId xmlns:a16="http://schemas.microsoft.com/office/drawing/2014/main" id="{48EC2494-F41A-4074-BD88-A816202B36C8}"/>
+              </a:ext>
+            </a:extLst>
+          </p:cNvPr>
+          <p:cNvPicPr>
+            <a:picLocks noChangeAspect="1"/>
+          </p:cNvPicPr>
+          <p:nvPr/>
+        </p:nvPicPr>
+        <p:blipFill rotWithShape="1">
+          <a:blip r:embed="rId4">
+            <a:duotone>
+              <a:schemeClr val="accent5">
+                <a:shade val="45000"/>
+                <a:satMod val="135000"/>
+              </a:schemeClr>
+              <a:prstClr val="white"/>
+            </a:duotone>
+            <a:alphaModFix/>
+            <a:extLst>
+              <a:ext uri="{28A0092B-C50C-407E-A947-70E740481C1C}">
+                <a14:useLocalDpi xmlns:a14="http://schemas.microsoft.com/office/drawing/2010/main" val="0"/>
+              </a:ext>
+            </a:extLst>
+          </a:blip>
+          <a:srcRect b="6439"/>
+          <a:stretch/>
+        </p:blipFill>
+        <p:spPr>
+          <a:xfrm>
+            <a:off x="330064" y="3992058"/>
+            <a:ext cx="1015340" cy="802019"/>
+          </a:xfrm>
+          <a:prstGeom prst="rect">
+            <a:avLst/>
+          </a:prstGeom>
+        </p:spPr>
+      </p:pic>
     </p:spTree>
     <p:extLst>
       <p:ext uri="{BB962C8B-B14F-4D97-AF65-F5344CB8AC3E}">
-        <p14:creationId xmlns:p14="http://schemas.microsoft.com/office/powerpoint/2010/main" val="2386058390"/>
+        <p14:creationId xmlns:p14="http://schemas.microsoft.com/office/powerpoint/2010/main" val="266123667"/>
       </p:ext>
     </p:extLst>
   </p:cSld>
@@ -7299,7 +8084,7 @@
           <p:cNvPr id="2" name="Title 1">
             <a:extLst>
               <a:ext uri="{FF2B5EF4-FFF2-40B4-BE49-F238E27FC236}">
-                <a16:creationId xmlns:a16="http://schemas.microsoft.com/office/drawing/2014/main" id="{0D745AD3-9A89-4DBF-A4D1-C2722CB2B0F8}"/>
+                <a16:creationId xmlns:a16="http://schemas.microsoft.com/office/drawing/2014/main" id="{E8143F64-849B-4A2C-AEBF-E287F3F41266}"/>
               </a:ext>
             </a:extLst>
           </p:cNvPr>
@@ -7315,7 +8100,10 @@
           <a:bodyPr/>
           <a:lstStyle/>
           <a:p>
-            <a:endParaRPr lang="en-US"/>
+            <a:r>
+              <a:rPr lang="en-US" dirty="0"/>
+              <a:t>Walking</a:t>
+            </a:r>
           </a:p>
         </p:txBody>
       </p:sp>
@@ -7324,7 +8112,7 @@
           <p:cNvPr id="3" name="Content Placeholder 2">
             <a:extLst>
               <a:ext uri="{FF2B5EF4-FFF2-40B4-BE49-F238E27FC236}">
-                <a16:creationId xmlns:a16="http://schemas.microsoft.com/office/drawing/2014/main" id="{A2D72E4D-D08D-4A14-8699-5F2E6F77D779}"/>
+                <a16:creationId xmlns:a16="http://schemas.microsoft.com/office/drawing/2014/main" id="{4691D9B2-4A28-4EED-8B7C-0D329E5BBF6D}"/>
               </a:ext>
             </a:extLst>
           </p:cNvPr>
@@ -7344,10 +8132,193 @@
           </a:p>
         </p:txBody>
       </p:sp>
+      <p:pic>
+        <p:nvPicPr>
+          <p:cNvPr id="6" name="Picture 4" descr="Related image">
+            <a:hlinkClick r:id="rId2"/>
+            <a:extLst>
+              <a:ext uri="{FF2B5EF4-FFF2-40B4-BE49-F238E27FC236}">
+                <a16:creationId xmlns:a16="http://schemas.microsoft.com/office/drawing/2014/main" id="{D107BD86-9E00-4E25-9DFC-438ED3007002}"/>
+              </a:ext>
+            </a:extLst>
+          </p:cNvPr>
+          <p:cNvPicPr>
+            <a:picLocks noChangeAspect="1" noChangeArrowheads="1"/>
+          </p:cNvPicPr>
+          <p:nvPr/>
+        </p:nvPicPr>
+        <p:blipFill>
+          <a:blip r:embed="rId3">
+            <a:duotone>
+              <a:schemeClr val="accent5">
+                <a:shade val="45000"/>
+                <a:satMod val="135000"/>
+              </a:schemeClr>
+              <a:prstClr val="white"/>
+            </a:duotone>
+            <a:alphaModFix/>
+            <a:extLst>
+              <a:ext uri="{28A0092B-C50C-407E-A947-70E740481C1C}">
+                <a14:useLocalDpi xmlns:a14="http://schemas.microsoft.com/office/drawing/2010/main" val="0"/>
+              </a:ext>
+            </a:extLst>
+          </a:blip>
+          <a:srcRect/>
+          <a:stretch>
+            <a:fillRect/>
+          </a:stretch>
+        </p:blipFill>
+        <p:spPr bwMode="auto">
+          <a:xfrm>
+            <a:off x="339767" y="4983464"/>
+            <a:ext cx="826446" cy="826446"/>
+          </a:xfrm>
+          <a:prstGeom prst="rect">
+            <a:avLst/>
+          </a:prstGeom>
+          <a:noFill/>
+          <a:extLst>
+            <a:ext uri="{909E8E84-426E-40DD-AFC4-6F175D3DCCD1}">
+              <a14:hiddenFill xmlns:a14="http://schemas.microsoft.com/office/drawing/2010/main">
+                <a:solidFill>
+                  <a:srgbClr val="FFFFFF"/>
+                </a:solidFill>
+              </a14:hiddenFill>
+            </a:ext>
+          </a:extLst>
+        </p:spPr>
+      </p:pic>
     </p:spTree>
     <p:extLst>
       <p:ext uri="{BB962C8B-B14F-4D97-AF65-F5344CB8AC3E}">
-        <p14:creationId xmlns:p14="http://schemas.microsoft.com/office/powerpoint/2010/main" val="3428998072"/>
+        <p14:creationId xmlns:p14="http://schemas.microsoft.com/office/powerpoint/2010/main" val="4234977848"/>
+      </p:ext>
+    </p:extLst>
+  </p:cSld>
+  <p:clrMapOvr>
+    <a:masterClrMapping/>
+  </p:clrMapOvr>
+</p:sld>
+</file>
+
+<file path=ppt/slides/slide17.xml><?xml version="1.0" encoding="utf-8"?>
+<p:sld xmlns:a="http://schemas.openxmlformats.org/drawingml/2006/main" xmlns:r="http://schemas.openxmlformats.org/officeDocument/2006/relationships" xmlns:p="http://schemas.openxmlformats.org/presentationml/2006/main">
+  <p:cSld>
+    <p:spTree>
+      <p:nvGrpSpPr>
+        <p:cNvPr id="1" name=""/>
+        <p:cNvGrpSpPr/>
+        <p:nvPr/>
+      </p:nvGrpSpPr>
+      <p:grpSpPr>
+        <a:xfrm>
+          <a:off x="0" y="0"/>
+          <a:ext cx="0" cy="0"/>
+          <a:chOff x="0" y="0"/>
+          <a:chExt cx="0" cy="0"/>
+        </a:xfrm>
+      </p:grpSpPr>
+      <p:sp>
+        <p:nvSpPr>
+          <p:cNvPr id="2" name="Title 1">
+            <a:extLst>
+              <a:ext uri="{FF2B5EF4-FFF2-40B4-BE49-F238E27FC236}">
+                <a16:creationId xmlns:a16="http://schemas.microsoft.com/office/drawing/2014/main" id="{CA226BA8-F57C-4CBA-981F-4BB3861580AD}"/>
+              </a:ext>
+            </a:extLst>
+          </p:cNvPr>
+          <p:cNvSpPr>
+            <a:spLocks noGrp="1"/>
+          </p:cNvSpPr>
+          <p:nvPr>
+            <p:ph type="title"/>
+          </p:nvPr>
+        </p:nvSpPr>
+        <p:spPr/>
+        <p:txBody>
+          <a:bodyPr/>
+          <a:lstStyle/>
+          <a:p>
+            <a:r>
+              <a:rPr lang="en-US" dirty="0"/>
+              <a:t>Other Transit</a:t>
+            </a:r>
+          </a:p>
+        </p:txBody>
+      </p:sp>
+      <p:sp>
+        <p:nvSpPr>
+          <p:cNvPr id="3" name="Content Placeholder 2">
+            <a:extLst>
+              <a:ext uri="{FF2B5EF4-FFF2-40B4-BE49-F238E27FC236}">
+                <a16:creationId xmlns:a16="http://schemas.microsoft.com/office/drawing/2014/main" id="{2ED32F58-589C-443E-8734-0A8E035B70D5}"/>
+              </a:ext>
+            </a:extLst>
+          </p:cNvPr>
+          <p:cNvSpPr>
+            <a:spLocks noGrp="1"/>
+          </p:cNvSpPr>
+          <p:nvPr>
+            <p:ph idx="1"/>
+          </p:nvPr>
+        </p:nvSpPr>
+        <p:spPr/>
+        <p:txBody>
+          <a:bodyPr/>
+          <a:lstStyle/>
+          <a:p>
+            <a:endParaRPr lang="en-US"/>
+          </a:p>
+        </p:txBody>
+      </p:sp>
+      <p:pic>
+        <p:nvPicPr>
+          <p:cNvPr id="10" name="Picture 9">
+            <a:extLst>
+              <a:ext uri="{FF2B5EF4-FFF2-40B4-BE49-F238E27FC236}">
+                <a16:creationId xmlns:a16="http://schemas.microsoft.com/office/drawing/2014/main" id="{80ECDEC8-3D8C-473D-A708-3540A96BD7A7}"/>
+              </a:ext>
+            </a:extLst>
+          </p:cNvPr>
+          <p:cNvPicPr>
+            <a:picLocks noChangeAspect="1"/>
+          </p:cNvPicPr>
+          <p:nvPr/>
+        </p:nvPicPr>
+        <p:blipFill>
+          <a:blip r:embed="rId2">
+            <a:duotone>
+              <a:schemeClr val="accent5">
+                <a:shade val="45000"/>
+                <a:satMod val="135000"/>
+              </a:schemeClr>
+              <a:prstClr val="white"/>
+            </a:duotone>
+            <a:alphaModFix/>
+            <a:extLst>
+              <a:ext uri="{28A0092B-C50C-407E-A947-70E740481C1C}">
+                <a14:useLocalDpi xmlns:a14="http://schemas.microsoft.com/office/drawing/2010/main" val="0"/>
+              </a:ext>
+            </a:extLst>
+          </a:blip>
+          <a:stretch>
+            <a:fillRect/>
+          </a:stretch>
+        </p:blipFill>
+        <p:spPr>
+          <a:xfrm>
+            <a:off x="336507" y="5771269"/>
+            <a:ext cx="826446" cy="826446"/>
+          </a:xfrm>
+          <a:prstGeom prst="rect">
+            <a:avLst/>
+          </a:prstGeom>
+        </p:spPr>
+      </p:pic>
+    </p:spTree>
+    <p:extLst>
+      <p:ext uri="{BB962C8B-B14F-4D97-AF65-F5344CB8AC3E}">
+        <p14:creationId xmlns:p14="http://schemas.microsoft.com/office/powerpoint/2010/main" val="16888013"/>
       </p:ext>
     </p:extLst>
   </p:cSld>
@@ -7568,7 +8539,7 @@
             </a:r>
             <a:r>
               <a:rPr lang="en-US" dirty="0"/>
-              <a:t>There is no difference between commuting types across counties in Missouri</a:t>
+              <a:t>No differences exist between commuting types in metro versus rural counties across Missouri.</a:t>
             </a:r>
           </a:p>
           <a:p>
@@ -7591,7 +8562,7 @@
             </a:r>
             <a:r>
               <a:rPr lang="en-US" dirty="0"/>
-              <a:t> = differences exist between commuting types across counties in Missouri</a:t>
+              <a:t> = Differences exist between commuting types in metro versus rural counties across Missouri, where usage of public transit in metro counties is higher.  </a:t>
             </a:r>
           </a:p>
         </p:txBody>
@@ -7631,7 +8602,7 @@
           <p:cNvPr id="2" name="Title 1">
             <a:extLst>
               <a:ext uri="{FF2B5EF4-FFF2-40B4-BE49-F238E27FC236}">
-                <a16:creationId xmlns:a16="http://schemas.microsoft.com/office/drawing/2014/main" id="{AE0F7C95-8B18-4770-B4EB-EFA7DEA3945C}"/>
+                <a16:creationId xmlns:a16="http://schemas.microsoft.com/office/drawing/2014/main" id="{7540248E-E715-4FFB-9952-2EB8BB3C1D4D}"/>
               </a:ext>
             </a:extLst>
           </p:cNvPr>
@@ -7642,568 +8613,70 @@
             <p:ph type="title"/>
           </p:nvPr>
         </p:nvSpPr>
-        <p:spPr>
-          <a:xfrm>
-            <a:off x="1533831" y="365125"/>
-            <a:ext cx="9763433" cy="1325563"/>
-          </a:xfrm>
-        </p:spPr>
+        <p:spPr/>
+        <p:txBody>
+          <a:bodyPr/>
+          <a:lstStyle/>
+          <a:p>
+            <a:r>
+              <a:rPr lang="en-US" dirty="0"/>
+              <a:t>Definition of Commuting</a:t>
+            </a:r>
+          </a:p>
+        </p:txBody>
+      </p:sp>
+      <p:sp>
+        <p:nvSpPr>
+          <p:cNvPr id="3" name="Content Placeholder 2">
+            <a:extLst>
+              <a:ext uri="{FF2B5EF4-FFF2-40B4-BE49-F238E27FC236}">
+                <a16:creationId xmlns:a16="http://schemas.microsoft.com/office/drawing/2014/main" id="{4EB8CA07-15E3-44DC-A0A8-5120AA5511F2}"/>
+              </a:ext>
+            </a:extLst>
+          </p:cNvPr>
+          <p:cNvSpPr>
+            <a:spLocks noGrp="1"/>
+          </p:cNvSpPr>
+          <p:nvPr>
+            <p:ph idx="1"/>
+          </p:nvPr>
+        </p:nvSpPr>
+        <p:spPr/>
         <p:txBody>
           <a:bodyPr>
             <a:normAutofit/>
           </a:bodyPr>
           <a:lstStyle/>
           <a:p>
-            <a:r>
-              <a:rPr lang="en-US" sz="4000" b="1" dirty="0"/>
-              <a:t>Metropolitan Statistical Areas Analyzed</a:t>
-            </a:r>
-          </a:p>
-        </p:txBody>
-      </p:sp>
-      <p:sp>
-        <p:nvSpPr>
-          <p:cNvPr id="3" name="Content Placeholder 2">
-            <a:extLst>
-              <a:ext uri="{FF2B5EF4-FFF2-40B4-BE49-F238E27FC236}">
-                <a16:creationId xmlns:a16="http://schemas.microsoft.com/office/drawing/2014/main" id="{C26E86F2-BC11-4C17-8CF1-DCBE4A28DFE8}"/>
-              </a:ext>
-            </a:extLst>
-          </p:cNvPr>
-          <p:cNvSpPr>
-            <a:spLocks noGrp="1"/>
-          </p:cNvSpPr>
-          <p:nvPr>
-            <p:ph idx="1"/>
-          </p:nvPr>
-        </p:nvSpPr>
-        <p:spPr>
-          <a:xfrm>
-            <a:off x="1533832" y="1616390"/>
-            <a:ext cx="9438968" cy="4563122"/>
-          </a:xfrm>
-        </p:spPr>
-        <p:txBody>
-          <a:bodyPr numCol="3" spcCol="457200">
-            <a:noAutofit/>
-          </a:bodyPr>
-          <a:lstStyle/>
-          <a:p>
-            <a:pPr marL="0" indent="0">
-              <a:buNone/>
-            </a:pPr>
-            <a:r>
-              <a:rPr lang="en-US" sz="1800" b="1" dirty="0"/>
-              <a:t>St. Louis</a:t>
-            </a:r>
-          </a:p>
-          <a:p>
-            <a:r>
-              <a:rPr lang="en-US" sz="1800" dirty="0"/>
-              <a:t>St. Louis City, MO</a:t>
-            </a:r>
-          </a:p>
-          <a:p>
-            <a:pPr>
-              <a:lnSpc>
-                <a:spcPct val="100000"/>
-              </a:lnSpc>
-              <a:spcBef>
-                <a:spcPts val="0"/>
-              </a:spcBef>
-            </a:pPr>
-            <a:r>
-              <a:rPr lang="en-US" sz="1800" dirty="0"/>
-              <a:t>St. Louis County, MO</a:t>
-            </a:r>
-          </a:p>
-          <a:p>
-            <a:pPr>
-              <a:lnSpc>
-                <a:spcPct val="100000"/>
-              </a:lnSpc>
-              <a:spcBef>
-                <a:spcPts val="0"/>
-              </a:spcBef>
-            </a:pPr>
-            <a:r>
-              <a:rPr lang="en-US" sz="1800" dirty="0"/>
-              <a:t>St. Charles County, MO</a:t>
-            </a:r>
-          </a:p>
-          <a:p>
-            <a:pPr>
-              <a:lnSpc>
-                <a:spcPct val="100000"/>
-              </a:lnSpc>
-              <a:spcBef>
-                <a:spcPts val="0"/>
-              </a:spcBef>
-            </a:pPr>
-            <a:r>
-              <a:rPr lang="en-US" sz="1800" dirty="0"/>
-              <a:t>Jefferson County, MO</a:t>
-            </a:r>
-          </a:p>
-          <a:p>
-            <a:pPr>
-              <a:lnSpc>
-                <a:spcPct val="100000"/>
-              </a:lnSpc>
-              <a:spcBef>
-                <a:spcPts val="0"/>
-              </a:spcBef>
-            </a:pPr>
-            <a:r>
-              <a:rPr lang="en-US" sz="1800" dirty="0"/>
-              <a:t>Franklin County, MO</a:t>
-            </a:r>
-          </a:p>
-          <a:p>
-            <a:pPr>
-              <a:lnSpc>
-                <a:spcPct val="100000"/>
-              </a:lnSpc>
-              <a:spcBef>
-                <a:spcPts val="0"/>
-              </a:spcBef>
-            </a:pPr>
-            <a:r>
-              <a:rPr lang="en-US" sz="1800" dirty="0"/>
-              <a:t>Lincoln County, MO</a:t>
-            </a:r>
-          </a:p>
-          <a:p>
-            <a:pPr>
-              <a:lnSpc>
-                <a:spcPct val="100000"/>
-              </a:lnSpc>
-              <a:spcBef>
-                <a:spcPts val="0"/>
-              </a:spcBef>
-            </a:pPr>
-            <a:r>
-              <a:rPr lang="en-US" sz="1800" dirty="0"/>
-              <a:t>Warren County, MO</a:t>
-            </a:r>
-          </a:p>
-          <a:p>
-            <a:pPr>
-              <a:lnSpc>
-                <a:spcPct val="100000"/>
-              </a:lnSpc>
-              <a:spcBef>
-                <a:spcPts val="0"/>
-              </a:spcBef>
-            </a:pPr>
-            <a:r>
-              <a:rPr lang="en-US" sz="1800" dirty="0"/>
-              <a:t>Madison County, IL</a:t>
-            </a:r>
-          </a:p>
-          <a:p>
-            <a:pPr>
-              <a:lnSpc>
-                <a:spcPct val="100000"/>
-              </a:lnSpc>
-              <a:spcBef>
-                <a:spcPts val="0"/>
-              </a:spcBef>
-            </a:pPr>
-            <a:r>
-              <a:rPr lang="en-US" sz="1800" dirty="0"/>
-              <a:t>St. Clair County, IL</a:t>
-            </a:r>
-          </a:p>
-          <a:p>
-            <a:pPr>
-              <a:lnSpc>
-                <a:spcPct val="100000"/>
-              </a:lnSpc>
-              <a:spcBef>
-                <a:spcPts val="0"/>
-              </a:spcBef>
-            </a:pPr>
-            <a:r>
-              <a:rPr lang="en-US" sz="1800" dirty="0"/>
-              <a:t>Clinton County, IL</a:t>
-            </a:r>
-          </a:p>
-          <a:p>
-            <a:pPr>
-              <a:lnSpc>
-                <a:spcPct val="100000"/>
-              </a:lnSpc>
-              <a:spcBef>
-                <a:spcPts val="0"/>
-              </a:spcBef>
-            </a:pPr>
-            <a:r>
-              <a:rPr lang="en-US" sz="1800" dirty="0"/>
-              <a:t>Monroe County, IL</a:t>
-            </a:r>
-          </a:p>
-          <a:p>
-            <a:pPr>
-              <a:lnSpc>
-                <a:spcPct val="100000"/>
-              </a:lnSpc>
-              <a:spcBef>
-                <a:spcPts val="0"/>
-              </a:spcBef>
-            </a:pPr>
-            <a:r>
-              <a:rPr lang="en-US" sz="1800" dirty="0"/>
-              <a:t>Jersey County, IL</a:t>
-            </a:r>
-          </a:p>
-          <a:p>
-            <a:pPr>
-              <a:lnSpc>
-                <a:spcPct val="120000"/>
-              </a:lnSpc>
-              <a:spcBef>
-                <a:spcPts val="600"/>
-              </a:spcBef>
-            </a:pPr>
-            <a:endParaRPr lang="en-US" sz="1800" dirty="0"/>
-          </a:p>
-          <a:p>
-            <a:pPr>
-              <a:lnSpc>
-                <a:spcPct val="120000"/>
-              </a:lnSpc>
-              <a:spcBef>
-                <a:spcPts val="600"/>
-              </a:spcBef>
-            </a:pPr>
-            <a:endParaRPr lang="en-US" sz="1800" dirty="0"/>
-          </a:p>
-          <a:p>
-            <a:pPr marL="0" indent="0">
-              <a:lnSpc>
-                <a:spcPct val="120000"/>
-              </a:lnSpc>
-              <a:spcBef>
-                <a:spcPts val="600"/>
-              </a:spcBef>
-              <a:buNone/>
-            </a:pPr>
-            <a:r>
-              <a:rPr lang="en-US" sz="1800" b="1" dirty="0"/>
-              <a:t>Kansas City</a:t>
-            </a:r>
-            <a:endParaRPr lang="en-US" sz="1800" dirty="0"/>
-          </a:p>
-          <a:p>
-            <a:pPr>
-              <a:lnSpc>
-                <a:spcPct val="100000"/>
-              </a:lnSpc>
-              <a:spcBef>
-                <a:spcPts val="0"/>
-              </a:spcBef>
-            </a:pPr>
-            <a:r>
-              <a:rPr lang="en-US" sz="1800" dirty="0"/>
-              <a:t>Bates County, MO</a:t>
-            </a:r>
-          </a:p>
-          <a:p>
-            <a:pPr>
-              <a:lnSpc>
-                <a:spcPct val="100000"/>
-              </a:lnSpc>
-              <a:spcBef>
-                <a:spcPts val="0"/>
-              </a:spcBef>
-            </a:pPr>
-            <a:r>
-              <a:rPr lang="en-US" sz="1800" dirty="0"/>
-              <a:t>Caldwell County, MO</a:t>
-            </a:r>
-          </a:p>
-          <a:p>
-            <a:pPr>
-              <a:lnSpc>
-                <a:spcPct val="100000"/>
-              </a:lnSpc>
-              <a:spcBef>
-                <a:spcPts val="0"/>
-              </a:spcBef>
-            </a:pPr>
-            <a:r>
-              <a:rPr lang="en-US" sz="1800" dirty="0"/>
-              <a:t>Cass County, MO</a:t>
-            </a:r>
-          </a:p>
-          <a:p>
-            <a:pPr>
-              <a:lnSpc>
-                <a:spcPct val="100000"/>
-              </a:lnSpc>
-              <a:spcBef>
-                <a:spcPts val="0"/>
-              </a:spcBef>
-            </a:pPr>
-            <a:r>
-              <a:rPr lang="en-US" sz="1800" dirty="0"/>
-              <a:t>Clay County, MO</a:t>
-            </a:r>
-          </a:p>
-          <a:p>
-            <a:pPr>
-              <a:lnSpc>
-                <a:spcPct val="100000"/>
-              </a:lnSpc>
-              <a:spcBef>
-                <a:spcPts val="0"/>
-              </a:spcBef>
-            </a:pPr>
-            <a:r>
-              <a:rPr lang="en-US" sz="1800" dirty="0"/>
-              <a:t>Clinton County, MO</a:t>
-            </a:r>
-          </a:p>
-          <a:p>
-            <a:pPr>
-              <a:lnSpc>
-                <a:spcPct val="100000"/>
-              </a:lnSpc>
-              <a:spcBef>
-                <a:spcPts val="0"/>
-              </a:spcBef>
-            </a:pPr>
-            <a:r>
-              <a:rPr lang="en-US" sz="1800" dirty="0"/>
-              <a:t>Jackson County, MO</a:t>
-            </a:r>
-          </a:p>
-          <a:p>
-            <a:pPr>
-              <a:lnSpc>
-                <a:spcPct val="100000"/>
-              </a:lnSpc>
-              <a:spcBef>
-                <a:spcPts val="0"/>
-              </a:spcBef>
-            </a:pPr>
-            <a:r>
-              <a:rPr lang="en-US" sz="1800" dirty="0"/>
-              <a:t>Lafayette County, MO</a:t>
-            </a:r>
-          </a:p>
-          <a:p>
-            <a:pPr>
-              <a:lnSpc>
-                <a:spcPct val="100000"/>
-              </a:lnSpc>
-              <a:spcBef>
-                <a:spcPts val="0"/>
-              </a:spcBef>
-            </a:pPr>
-            <a:r>
-              <a:rPr lang="en-US" sz="1800" dirty="0"/>
-              <a:t>Platte County, MO</a:t>
-            </a:r>
-          </a:p>
-          <a:p>
-            <a:pPr>
-              <a:lnSpc>
-                <a:spcPct val="100000"/>
-              </a:lnSpc>
-              <a:spcBef>
-                <a:spcPts val="0"/>
-              </a:spcBef>
-            </a:pPr>
-            <a:r>
-              <a:rPr lang="en-US" sz="1800" dirty="0"/>
-              <a:t>Ray County, MO</a:t>
-            </a:r>
-          </a:p>
-          <a:p>
-            <a:pPr>
-              <a:lnSpc>
-                <a:spcPct val="100000"/>
-              </a:lnSpc>
-              <a:spcBef>
-                <a:spcPts val="0"/>
-              </a:spcBef>
-            </a:pPr>
-            <a:r>
-              <a:rPr lang="en-US" sz="1800" dirty="0"/>
-              <a:t>Johnson County, KS</a:t>
-            </a:r>
-          </a:p>
-          <a:p>
-            <a:pPr>
-              <a:lnSpc>
-                <a:spcPct val="100000"/>
-              </a:lnSpc>
-              <a:spcBef>
-                <a:spcPts val="0"/>
-              </a:spcBef>
-            </a:pPr>
-            <a:r>
-              <a:rPr lang="en-US" sz="1800" dirty="0"/>
-              <a:t>Leavenworth County, KS</a:t>
-            </a:r>
-          </a:p>
-          <a:p>
-            <a:pPr>
-              <a:lnSpc>
-                <a:spcPct val="100000"/>
-              </a:lnSpc>
-              <a:spcBef>
-                <a:spcPts val="0"/>
-              </a:spcBef>
-            </a:pPr>
-            <a:r>
-              <a:rPr lang="en-US" sz="1800" dirty="0"/>
-              <a:t>Linn County, KS</a:t>
-            </a:r>
-          </a:p>
-          <a:p>
-            <a:pPr>
-              <a:lnSpc>
-                <a:spcPct val="100000"/>
-              </a:lnSpc>
-              <a:spcBef>
-                <a:spcPts val="0"/>
-              </a:spcBef>
-            </a:pPr>
-            <a:r>
-              <a:rPr lang="en-US" sz="1800" dirty="0"/>
-              <a:t>Miami County, KS</a:t>
-            </a:r>
-          </a:p>
-          <a:p>
-            <a:pPr>
-              <a:lnSpc>
-                <a:spcPct val="100000"/>
-              </a:lnSpc>
-              <a:spcBef>
-                <a:spcPts val="0"/>
-              </a:spcBef>
-            </a:pPr>
-            <a:r>
-              <a:rPr lang="en-US" sz="1800" dirty="0"/>
-              <a:t>Wyandotte County, KS</a:t>
-            </a:r>
-          </a:p>
-          <a:p>
-            <a:pPr marL="236538" indent="-236538">
-              <a:lnSpc>
-                <a:spcPct val="120000"/>
-              </a:lnSpc>
-              <a:spcBef>
-                <a:spcPts val="600"/>
-              </a:spcBef>
-              <a:buNone/>
-              <a:tabLst>
-                <a:tab pos="341313" algn="l"/>
-              </a:tabLst>
-            </a:pPr>
-            <a:r>
-              <a:rPr lang="en-US" sz="1800" b="1" dirty="0"/>
-              <a:t>Springfield</a:t>
-            </a:r>
-            <a:endParaRPr lang="en-US" sz="1800" dirty="0"/>
-          </a:p>
-          <a:p>
-            <a:pPr marL="236538" indent="-236538">
-              <a:lnSpc>
-                <a:spcPct val="100000"/>
-              </a:lnSpc>
-              <a:spcBef>
-                <a:spcPts val="0"/>
-              </a:spcBef>
-              <a:tabLst>
-                <a:tab pos="230188" algn="l"/>
-              </a:tabLst>
-            </a:pPr>
-            <a:r>
-              <a:rPr lang="en-US" sz="1800" dirty="0"/>
-              <a:t>Greene County, MO</a:t>
-            </a:r>
-          </a:p>
-          <a:p>
-            <a:pPr marL="236538" indent="-236538">
-              <a:lnSpc>
-                <a:spcPct val="100000"/>
-              </a:lnSpc>
-              <a:spcBef>
-                <a:spcPts val="0"/>
-              </a:spcBef>
-              <a:tabLst>
-                <a:tab pos="230188" algn="l"/>
-              </a:tabLst>
-            </a:pPr>
-            <a:r>
-              <a:rPr lang="en-US" sz="1800" dirty="0"/>
-              <a:t>Christian County, MO</a:t>
-            </a:r>
-          </a:p>
-          <a:p>
-            <a:pPr marL="236538" indent="-236538">
-              <a:lnSpc>
-                <a:spcPct val="100000"/>
-              </a:lnSpc>
-              <a:spcBef>
-                <a:spcPts val="0"/>
-              </a:spcBef>
-              <a:tabLst>
-                <a:tab pos="230188" algn="l"/>
-              </a:tabLst>
-            </a:pPr>
-            <a:r>
-              <a:rPr lang="en-US" sz="1800" dirty="0"/>
-              <a:t>Webster County, MO</a:t>
-            </a:r>
-          </a:p>
-          <a:p>
-            <a:pPr marL="236538" indent="-236538">
-              <a:lnSpc>
-                <a:spcPct val="100000"/>
-              </a:lnSpc>
-              <a:spcBef>
-                <a:spcPts val="0"/>
-              </a:spcBef>
-              <a:tabLst>
-                <a:tab pos="230188" algn="l"/>
-              </a:tabLst>
-            </a:pPr>
-            <a:r>
-              <a:rPr lang="en-US" sz="1800" dirty="0"/>
-              <a:t>Polk County, MO</a:t>
-            </a:r>
-          </a:p>
-          <a:p>
-            <a:pPr marL="236538" indent="-236538">
-              <a:lnSpc>
-                <a:spcPct val="100000"/>
-              </a:lnSpc>
-              <a:spcBef>
-                <a:spcPts val="0"/>
-              </a:spcBef>
-              <a:tabLst>
-                <a:tab pos="230188" algn="l"/>
-              </a:tabLst>
-            </a:pPr>
-            <a:r>
-              <a:rPr lang="en-US" sz="1800" dirty="0"/>
-              <a:t>Dallas County, MO</a:t>
-            </a:r>
-          </a:p>
-          <a:p>
-            <a:endParaRPr lang="en-US" sz="1400" dirty="0"/>
+            <a:pPr fontAlgn="base"/>
+            <a:r>
+              <a:rPr lang="en-US" dirty="0"/>
+              <a:t>Census surveys define Commuting (Journey to Work) as  “a worker’s travel from home to work”. </a:t>
+            </a:r>
+          </a:p>
+          <a:p>
+            <a:pPr fontAlgn="base"/>
+            <a:r>
+              <a:rPr lang="en-US" dirty="0"/>
+              <a:t>Census surveys ask questions about Commuting such as travel time, means of transportation, time of departure for work, vehicles available, and expenses associated with the commute.</a:t>
+            </a:r>
+          </a:p>
+          <a:p>
+            <a:pPr fontAlgn="base"/>
+            <a:r>
+              <a:rPr lang="en-US" dirty="0"/>
+              <a:t>For this analysis we looked only at means of transportation</a:t>
+            </a:r>
+          </a:p>
+          <a:p>
+            <a:endParaRPr lang="en-US" dirty="0"/>
           </a:p>
         </p:txBody>
       </p:sp>
     </p:spTree>
     <p:extLst>
       <p:ext uri="{BB962C8B-B14F-4D97-AF65-F5344CB8AC3E}">
-        <p14:creationId xmlns:p14="http://schemas.microsoft.com/office/powerpoint/2010/main" val="1842607254"/>
+        <p14:creationId xmlns:p14="http://schemas.microsoft.com/office/powerpoint/2010/main" val="3239497900"/>
       </p:ext>
     </p:extLst>
   </p:cSld>
@@ -8235,7 +8708,7 @@
           <p:cNvPr id="2" name="Title 1">
             <a:extLst>
               <a:ext uri="{FF2B5EF4-FFF2-40B4-BE49-F238E27FC236}">
-                <a16:creationId xmlns:a16="http://schemas.microsoft.com/office/drawing/2014/main" id="{5888785A-D677-45F8-9A8E-01CFAD384C68}"/>
+                <a16:creationId xmlns:a16="http://schemas.microsoft.com/office/drawing/2014/main" id="{B5D0FC5E-A58A-4472-8073-7CFD303508D2}"/>
               </a:ext>
             </a:extLst>
           </p:cNvPr>
@@ -8244,41 +8717,6 @@
           </p:cNvSpPr>
           <p:nvPr>
             <p:ph type="title"/>
-          </p:nvPr>
-        </p:nvSpPr>
-        <p:spPr>
-          <a:xfrm>
-            <a:off x="1533832" y="393291"/>
-            <a:ext cx="9153833" cy="1278194"/>
-          </a:xfrm>
-        </p:spPr>
-        <p:txBody>
-          <a:bodyPr>
-            <a:normAutofit/>
-          </a:bodyPr>
-          <a:lstStyle/>
-          <a:p>
-            <a:r>
-              <a:rPr lang="en-US" dirty="0"/>
-              <a:t>Solo Commuters</a:t>
-            </a:r>
-          </a:p>
-        </p:txBody>
-      </p:sp>
-      <p:sp>
-        <p:nvSpPr>
-          <p:cNvPr id="3" name="Content Placeholder 2">
-            <a:extLst>
-              <a:ext uri="{FF2B5EF4-FFF2-40B4-BE49-F238E27FC236}">
-                <a16:creationId xmlns:a16="http://schemas.microsoft.com/office/drawing/2014/main" id="{B6C6D485-D2CA-4D75-AA14-689F672BF597}"/>
-              </a:ext>
-            </a:extLst>
-          </p:cNvPr>
-          <p:cNvSpPr>
-            <a:spLocks noGrp="1"/>
-          </p:cNvSpPr>
-          <p:nvPr>
-            <p:ph idx="1"/>
           </p:nvPr>
         </p:nvSpPr>
         <p:spPr/>
@@ -8286,58 +8724,42 @@
           <a:bodyPr/>
           <a:lstStyle/>
           <a:p>
+            <a:r>
+              <a:rPr lang="en-US" dirty="0"/>
+              <a:t>Statewide Analysis</a:t>
+            </a:r>
+          </a:p>
+        </p:txBody>
+      </p:sp>
+      <p:sp>
+        <p:nvSpPr>
+          <p:cNvPr id="3" name="Content Placeholder 2">
+            <a:extLst>
+              <a:ext uri="{FF2B5EF4-FFF2-40B4-BE49-F238E27FC236}">
+                <a16:creationId xmlns:a16="http://schemas.microsoft.com/office/drawing/2014/main" id="{BA11E7FD-50A6-4480-8C7A-370A1D464BBB}"/>
+              </a:ext>
+            </a:extLst>
+          </p:cNvPr>
+          <p:cNvSpPr>
+            <a:spLocks noGrp="1"/>
+          </p:cNvSpPr>
+          <p:nvPr>
+            <p:ph idx="1"/>
+          </p:nvPr>
+        </p:nvSpPr>
+        <p:spPr/>
+        <p:txBody>
+          <a:bodyPr/>
+          <a:lstStyle/>
+          <a:p>
             <a:endParaRPr lang="en-US"/>
           </a:p>
         </p:txBody>
       </p:sp>
-      <p:pic>
-        <p:nvPicPr>
-          <p:cNvPr id="8" name="Picture 7">
-            <a:extLst>
-              <a:ext uri="{FF2B5EF4-FFF2-40B4-BE49-F238E27FC236}">
-                <a16:creationId xmlns:a16="http://schemas.microsoft.com/office/drawing/2014/main" id="{87FA2B47-7C08-4097-8ADD-BFD4D01FA4E2}"/>
-              </a:ext>
-            </a:extLst>
-          </p:cNvPr>
-          <p:cNvPicPr>
-            <a:picLocks noChangeAspect="1"/>
-          </p:cNvPicPr>
-          <p:nvPr/>
-        </p:nvPicPr>
-        <p:blipFill>
-          <a:blip r:embed="rId2">
-            <a:duotone>
-              <a:schemeClr val="accent5">
-                <a:shade val="45000"/>
-                <a:satMod val="135000"/>
-              </a:schemeClr>
-              <a:prstClr val="white"/>
-            </a:duotone>
-            <a:alphaModFix/>
-            <a:extLst>
-              <a:ext uri="{28A0092B-C50C-407E-A947-70E740481C1C}">
-                <a14:useLocalDpi xmlns:a14="http://schemas.microsoft.com/office/drawing/2010/main" val="0"/>
-              </a:ext>
-            </a:extLst>
-          </a:blip>
-          <a:stretch>
-            <a:fillRect/>
-          </a:stretch>
-        </p:blipFill>
-        <p:spPr>
-          <a:xfrm>
-            <a:off x="330530" y="1013916"/>
-            <a:ext cx="785829" cy="658861"/>
-          </a:xfrm>
-          <a:prstGeom prst="rect">
-            <a:avLst/>
-          </a:prstGeom>
-        </p:spPr>
-      </p:pic>
     </p:spTree>
     <p:extLst>
       <p:ext uri="{BB962C8B-B14F-4D97-AF65-F5344CB8AC3E}">
-        <p14:creationId xmlns:p14="http://schemas.microsoft.com/office/powerpoint/2010/main" val="3157146832"/>
+        <p14:creationId xmlns:p14="http://schemas.microsoft.com/office/powerpoint/2010/main" val="4139403711"/>
       </p:ext>
     </p:extLst>
   </p:cSld>
@@ -8369,7 +8791,7 @@
           <p:cNvPr id="2" name="Title 1">
             <a:extLst>
               <a:ext uri="{FF2B5EF4-FFF2-40B4-BE49-F238E27FC236}">
-                <a16:creationId xmlns:a16="http://schemas.microsoft.com/office/drawing/2014/main" id="{E8EE8BAA-BB1D-4C31-8A63-059AF36583C0}"/>
+                <a16:creationId xmlns:a16="http://schemas.microsoft.com/office/drawing/2014/main" id="{FA51EDA6-12A4-4AF7-876B-D9CEDC2391E1}"/>
               </a:ext>
             </a:extLst>
           </p:cNvPr>
@@ -8380,72 +8802,36 @@
             <p:ph type="title"/>
           </p:nvPr>
         </p:nvSpPr>
-        <p:spPr>
-          <a:xfrm>
-            <a:off x="1533832" y="365125"/>
-            <a:ext cx="9153833" cy="1316191"/>
-          </a:xfrm>
-        </p:spPr>
+        <p:spPr/>
         <p:txBody>
           <a:bodyPr/>
           <a:lstStyle/>
           <a:p>
             <a:r>
               <a:rPr lang="en-US" dirty="0"/>
-              <a:t>Carpoolers</a:t>
-            </a:r>
-          </a:p>
-        </p:txBody>
-      </p:sp>
-      <p:sp>
-        <p:nvSpPr>
-          <p:cNvPr id="3" name="Content Placeholder 2">
-            <a:extLst>
-              <a:ext uri="{FF2B5EF4-FFF2-40B4-BE49-F238E27FC236}">
-                <a16:creationId xmlns:a16="http://schemas.microsoft.com/office/drawing/2014/main" id="{C7356092-B8A3-4539-85D3-6F6EF835CF93}"/>
-              </a:ext>
-            </a:extLst>
-          </p:cNvPr>
-          <p:cNvSpPr>
-            <a:spLocks noGrp="1"/>
-          </p:cNvSpPr>
-          <p:nvPr>
-            <p:ph idx="1"/>
-          </p:nvPr>
-        </p:nvSpPr>
-        <p:spPr/>
-        <p:txBody>
-          <a:bodyPr/>
-          <a:lstStyle/>
-          <a:p>
-            <a:endParaRPr lang="en-US"/>
+              <a:t>Statewide Analysis</a:t>
+            </a:r>
           </a:p>
         </p:txBody>
       </p:sp>
       <p:pic>
         <p:nvPicPr>
-          <p:cNvPr id="7" name="Picture 6">
-            <a:extLst>
-              <a:ext uri="{FF2B5EF4-FFF2-40B4-BE49-F238E27FC236}">
-                <a16:creationId xmlns:a16="http://schemas.microsoft.com/office/drawing/2014/main" id="{6379E98B-471A-40BE-ADDD-3EE87B718E00}"/>
+          <p:cNvPr id="6" name="Content Placeholder 5">
+            <a:extLst>
+              <a:ext uri="{FF2B5EF4-FFF2-40B4-BE49-F238E27FC236}">
+                <a16:creationId xmlns:a16="http://schemas.microsoft.com/office/drawing/2014/main" id="{697ECFAE-0E16-47DE-9238-714B5DD49354}"/>
               </a:ext>
             </a:extLst>
           </p:cNvPr>
           <p:cNvPicPr>
-            <a:picLocks noChangeAspect="1"/>
+            <a:picLocks noGrp="1" noChangeAspect="1"/>
           </p:cNvPicPr>
-          <p:nvPr/>
+          <p:nvPr>
+            <p:ph idx="1"/>
+          </p:nvPr>
         </p:nvPicPr>
         <p:blipFill>
           <a:blip r:embed="rId2">
-            <a:duotone>
-              <a:schemeClr val="accent5">
-                <a:shade val="45000"/>
-                <a:satMod val="135000"/>
-              </a:schemeClr>
-              <a:prstClr val="white"/>
-            </a:duotone>
-            <a:alphaModFix/>
             <a:extLst>
               <a:ext uri="{28A0092B-C50C-407E-A947-70E740481C1C}">
                 <a14:useLocalDpi xmlns:a14="http://schemas.microsoft.com/office/drawing/2010/main" val="0"/>
@@ -8458,18 +8844,40 @@
         </p:blipFill>
         <p:spPr>
           <a:xfrm>
-            <a:off x="330530" y="1901976"/>
-            <a:ext cx="897724" cy="751699"/>
-          </a:xfrm>
-          <a:prstGeom prst="rect">
-            <a:avLst/>
-          </a:prstGeom>
+            <a:off x="5239219" y="1645832"/>
+            <a:ext cx="5386027" cy="3556810"/>
+          </a:xfrm>
         </p:spPr>
       </p:pic>
+      <p:sp>
+        <p:nvSpPr>
+          <p:cNvPr id="4" name="Text Placeholder 3">
+            <a:extLst>
+              <a:ext uri="{FF2B5EF4-FFF2-40B4-BE49-F238E27FC236}">
+                <a16:creationId xmlns:a16="http://schemas.microsoft.com/office/drawing/2014/main" id="{3B7831F8-E75F-4A17-BD48-9CCD89C2D41E}"/>
+              </a:ext>
+            </a:extLst>
+          </p:cNvPr>
+          <p:cNvSpPr>
+            <a:spLocks noGrp="1"/>
+          </p:cNvSpPr>
+          <p:nvPr>
+            <p:ph type="body" sz="half" idx="2"/>
+          </p:nvPr>
+        </p:nvSpPr>
+        <p:spPr/>
+        <p:txBody>
+          <a:bodyPr/>
+          <a:lstStyle/>
+          <a:p>
+            <a:endParaRPr lang="en-US"/>
+          </a:p>
+        </p:txBody>
+      </p:sp>
     </p:spTree>
     <p:extLst>
       <p:ext uri="{BB962C8B-B14F-4D97-AF65-F5344CB8AC3E}">
-        <p14:creationId xmlns:p14="http://schemas.microsoft.com/office/powerpoint/2010/main" val="795467078"/>
+        <p14:creationId xmlns:p14="http://schemas.microsoft.com/office/powerpoint/2010/main" val="2590314423"/>
       </p:ext>
     </p:extLst>
   </p:cSld>
@@ -8501,7 +8909,7 @@
           <p:cNvPr id="2" name="Title 1">
             <a:extLst>
               <a:ext uri="{FF2B5EF4-FFF2-40B4-BE49-F238E27FC236}">
-                <a16:creationId xmlns:a16="http://schemas.microsoft.com/office/drawing/2014/main" id="{2B986B38-EDB0-4229-8D71-F960F7D05BC9}"/>
+                <a16:creationId xmlns:a16="http://schemas.microsoft.com/office/drawing/2014/main" id="{2F013819-0358-4800-A10B-6A73E73B8CFA}"/>
               </a:ext>
             </a:extLst>
           </p:cNvPr>
@@ -8519,7 +8927,7 @@
           <a:p>
             <a:r>
               <a:rPr lang="en-US" dirty="0"/>
-              <a:t>Public Transit</a:t>
+              <a:t>Urban vs. Rural Analysis</a:t>
             </a:r>
           </a:p>
         </p:txBody>
@@ -8529,7 +8937,7 @@
           <p:cNvPr id="3" name="Content Placeholder 2">
             <a:extLst>
               <a:ext uri="{FF2B5EF4-FFF2-40B4-BE49-F238E27FC236}">
-                <a16:creationId xmlns:a16="http://schemas.microsoft.com/office/drawing/2014/main" id="{B5C25182-F4DE-494E-BEFF-FE4D64D14941}"/>
+                <a16:creationId xmlns:a16="http://schemas.microsoft.com/office/drawing/2014/main" id="{C2A6475D-AA54-44F2-A6CD-99A20FEFE1BB}"/>
               </a:ext>
             </a:extLst>
           </p:cNvPr>
@@ -8549,109 +8957,10 @@
           </a:p>
         </p:txBody>
       </p:sp>
-      <p:pic>
-        <p:nvPicPr>
-          <p:cNvPr id="5" name="Picture 2" descr="Related image">
-            <a:hlinkClick r:id="rId2"/>
-            <a:extLst>
-              <a:ext uri="{FF2B5EF4-FFF2-40B4-BE49-F238E27FC236}">
-                <a16:creationId xmlns:a16="http://schemas.microsoft.com/office/drawing/2014/main" id="{4983EE56-BAED-474D-9D79-808886360B0B}"/>
-              </a:ext>
-            </a:extLst>
-          </p:cNvPr>
-          <p:cNvPicPr>
-            <a:picLocks noChangeAspect="1" noChangeArrowheads="1"/>
-          </p:cNvPicPr>
-          <p:nvPr/>
-        </p:nvPicPr>
-        <p:blipFill>
-          <a:blip r:embed="rId3">
-            <a:duotone>
-              <a:schemeClr val="accent5">
-                <a:shade val="45000"/>
-                <a:satMod val="135000"/>
-              </a:schemeClr>
-              <a:prstClr val="white"/>
-            </a:duotone>
-            <a:alphaModFix/>
-            <a:extLst>
-              <a:ext uri="{28A0092B-C50C-407E-A947-70E740481C1C}">
-                <a14:useLocalDpi xmlns:a14="http://schemas.microsoft.com/office/drawing/2010/main" val="0"/>
-              </a:ext>
-            </a:extLst>
-          </a:blip>
-          <a:srcRect/>
-          <a:stretch>
-            <a:fillRect/>
-          </a:stretch>
-        </p:blipFill>
-        <p:spPr bwMode="auto">
-          <a:xfrm>
-            <a:off x="339766" y="2928309"/>
-            <a:ext cx="749940" cy="802019"/>
-          </a:xfrm>
-          <a:prstGeom prst="rect">
-            <a:avLst/>
-          </a:prstGeom>
-          <a:noFill/>
-          <a:extLst>
-            <a:ext uri="{909E8E84-426E-40DD-AFC4-6F175D3DCCD1}">
-              <a14:hiddenFill xmlns:a14="http://schemas.microsoft.com/office/drawing/2010/main">
-                <a:solidFill>
-                  <a:srgbClr val="FFFFFF"/>
-                </a:solidFill>
-              </a14:hiddenFill>
-            </a:ext>
-          </a:extLst>
-        </p:spPr>
-      </p:pic>
-      <p:pic>
-        <p:nvPicPr>
-          <p:cNvPr id="9" name="Picture 8">
-            <a:extLst>
-              <a:ext uri="{FF2B5EF4-FFF2-40B4-BE49-F238E27FC236}">
-                <a16:creationId xmlns:a16="http://schemas.microsoft.com/office/drawing/2014/main" id="{48EC2494-F41A-4074-BD88-A816202B36C8}"/>
-              </a:ext>
-            </a:extLst>
-          </p:cNvPr>
-          <p:cNvPicPr>
-            <a:picLocks noChangeAspect="1"/>
-          </p:cNvPicPr>
-          <p:nvPr/>
-        </p:nvPicPr>
-        <p:blipFill rotWithShape="1">
-          <a:blip r:embed="rId4">
-            <a:duotone>
-              <a:schemeClr val="accent5">
-                <a:shade val="45000"/>
-                <a:satMod val="135000"/>
-              </a:schemeClr>
-              <a:prstClr val="white"/>
-            </a:duotone>
-            <a:alphaModFix/>
-            <a:extLst>
-              <a:ext uri="{28A0092B-C50C-407E-A947-70E740481C1C}">
-                <a14:useLocalDpi xmlns:a14="http://schemas.microsoft.com/office/drawing/2010/main" val="0"/>
-              </a:ext>
-            </a:extLst>
-          </a:blip>
-          <a:srcRect b="6439"/>
-          <a:stretch/>
-        </p:blipFill>
-        <p:spPr>
-          <a:xfrm>
-            <a:off x="330064" y="3992058"/>
-            <a:ext cx="1015340" cy="802019"/>
-          </a:xfrm>
-          <a:prstGeom prst="rect">
-            <a:avLst/>
-          </a:prstGeom>
-        </p:spPr>
-      </p:pic>
     </p:spTree>
     <p:extLst>
       <p:ext uri="{BB962C8B-B14F-4D97-AF65-F5344CB8AC3E}">
-        <p14:creationId xmlns:p14="http://schemas.microsoft.com/office/powerpoint/2010/main" val="266123667"/>
+        <p14:creationId xmlns:p14="http://schemas.microsoft.com/office/powerpoint/2010/main" val="4119927468"/>
       </p:ext>
     </p:extLst>
   </p:cSld>
@@ -8680,10 +8989,10 @@
       </p:grpSpPr>
       <p:sp>
         <p:nvSpPr>
-          <p:cNvPr id="2" name="Title 1">
-            <a:extLst>
-              <a:ext uri="{FF2B5EF4-FFF2-40B4-BE49-F238E27FC236}">
-                <a16:creationId xmlns:a16="http://schemas.microsoft.com/office/drawing/2014/main" id="{E8143F64-849B-4A2C-AEBF-E287F3F41266}"/>
+          <p:cNvPr id="4" name="Title 3">
+            <a:extLst>
+              <a:ext uri="{FF2B5EF4-FFF2-40B4-BE49-F238E27FC236}">
+                <a16:creationId xmlns:a16="http://schemas.microsoft.com/office/drawing/2014/main" id="{0704D786-B9E2-487E-B7F4-7F97CBC129E2}"/>
               </a:ext>
             </a:extLst>
           </p:cNvPr>
@@ -8699,19 +9008,16 @@
           <a:bodyPr/>
           <a:lstStyle/>
           <a:p>
-            <a:r>
-              <a:rPr lang="en-US" dirty="0"/>
-              <a:t>Walking</a:t>
-            </a:r>
-          </a:p>
-        </p:txBody>
-      </p:sp>
-      <p:sp>
-        <p:nvSpPr>
-          <p:cNvPr id="3" name="Content Placeholder 2">
-            <a:extLst>
-              <a:ext uri="{FF2B5EF4-FFF2-40B4-BE49-F238E27FC236}">
-                <a16:creationId xmlns:a16="http://schemas.microsoft.com/office/drawing/2014/main" id="{4691D9B2-4A28-4EED-8B7C-0D329E5BBF6D}"/>
+            <a:endParaRPr lang="en-US"/>
+          </a:p>
+        </p:txBody>
+      </p:sp>
+      <p:sp>
+        <p:nvSpPr>
+          <p:cNvPr id="5" name="Content Placeholder 4">
+            <a:extLst>
+              <a:ext uri="{FF2B5EF4-FFF2-40B4-BE49-F238E27FC236}">
+                <a16:creationId xmlns:a16="http://schemas.microsoft.com/office/drawing/2014/main" id="{6AEC7634-A30E-45E9-A8F0-4AA15033127D}"/>
               </a:ext>
             </a:extLst>
           </p:cNvPr>
@@ -8731,66 +9037,35 @@
           </a:p>
         </p:txBody>
       </p:sp>
-      <p:pic>
-        <p:nvPicPr>
-          <p:cNvPr id="6" name="Picture 4" descr="Related image">
-            <a:hlinkClick r:id="rId2"/>
-            <a:extLst>
-              <a:ext uri="{FF2B5EF4-FFF2-40B4-BE49-F238E27FC236}">
-                <a16:creationId xmlns:a16="http://schemas.microsoft.com/office/drawing/2014/main" id="{D107BD86-9E00-4E25-9DFC-438ED3007002}"/>
-              </a:ext>
-            </a:extLst>
-          </p:cNvPr>
-          <p:cNvPicPr>
-            <a:picLocks noChangeAspect="1" noChangeArrowheads="1"/>
-          </p:cNvPicPr>
-          <p:nvPr/>
-        </p:nvPicPr>
-        <p:blipFill>
-          <a:blip r:embed="rId3">
-            <a:duotone>
-              <a:schemeClr val="accent5">
-                <a:shade val="45000"/>
-                <a:satMod val="135000"/>
-              </a:schemeClr>
-              <a:prstClr val="white"/>
-            </a:duotone>
-            <a:alphaModFix/>
-            <a:extLst>
-              <a:ext uri="{28A0092B-C50C-407E-A947-70E740481C1C}">
-                <a14:useLocalDpi xmlns:a14="http://schemas.microsoft.com/office/drawing/2010/main" val="0"/>
-              </a:ext>
-            </a:extLst>
-          </a:blip>
-          <a:srcRect/>
-          <a:stretch>
-            <a:fillRect/>
-          </a:stretch>
-        </p:blipFill>
-        <p:spPr bwMode="auto">
-          <a:xfrm>
-            <a:off x="339767" y="4983464"/>
-            <a:ext cx="826446" cy="826446"/>
-          </a:xfrm>
-          <a:prstGeom prst="rect">
-            <a:avLst/>
-          </a:prstGeom>
-          <a:noFill/>
-          <a:extLst>
-            <a:ext uri="{909E8E84-426E-40DD-AFC4-6F175D3DCCD1}">
-              <a14:hiddenFill xmlns:a14="http://schemas.microsoft.com/office/drawing/2010/main">
-                <a:solidFill>
-                  <a:srgbClr val="FFFFFF"/>
-                </a:solidFill>
-              </a14:hiddenFill>
-            </a:ext>
-          </a:extLst>
-        </p:spPr>
-      </p:pic>
+      <p:sp>
+        <p:nvSpPr>
+          <p:cNvPr id="6" name="Text Placeholder 5">
+            <a:extLst>
+              <a:ext uri="{FF2B5EF4-FFF2-40B4-BE49-F238E27FC236}">
+                <a16:creationId xmlns:a16="http://schemas.microsoft.com/office/drawing/2014/main" id="{7C910199-C214-46B4-A067-7FED1F7A81F6}"/>
+              </a:ext>
+            </a:extLst>
+          </p:cNvPr>
+          <p:cNvSpPr>
+            <a:spLocks noGrp="1"/>
+          </p:cNvSpPr>
+          <p:nvPr>
+            <p:ph type="body" sz="half" idx="2"/>
+          </p:nvPr>
+        </p:nvSpPr>
+        <p:spPr/>
+        <p:txBody>
+          <a:bodyPr/>
+          <a:lstStyle/>
+          <a:p>
+            <a:endParaRPr lang="en-US"/>
+          </a:p>
+        </p:txBody>
+      </p:sp>
     </p:spTree>
     <p:extLst>
       <p:ext uri="{BB962C8B-B14F-4D97-AF65-F5344CB8AC3E}">
-        <p14:creationId xmlns:p14="http://schemas.microsoft.com/office/powerpoint/2010/main" val="4234977848"/>
+        <p14:creationId xmlns:p14="http://schemas.microsoft.com/office/powerpoint/2010/main" val="2386058390"/>
       </p:ext>
     </p:extLst>
   </p:cSld>
@@ -8822,7 +9097,7 @@
           <p:cNvPr id="2" name="Title 1">
             <a:extLst>
               <a:ext uri="{FF2B5EF4-FFF2-40B4-BE49-F238E27FC236}">
-                <a16:creationId xmlns:a16="http://schemas.microsoft.com/office/drawing/2014/main" id="{CA226BA8-F57C-4CBA-981F-4BB3861580AD}"/>
+                <a16:creationId xmlns:a16="http://schemas.microsoft.com/office/drawing/2014/main" id="{824D4802-761B-44E4-87AF-2979CE3F64EC}"/>
               </a:ext>
             </a:extLst>
           </p:cNvPr>
@@ -8840,7 +9115,7 @@
           <a:p>
             <a:r>
               <a:rPr lang="en-US" dirty="0"/>
-              <a:t>Other Transit</a:t>
+              <a:t>Analysis of Missouri’s Metropolitan Statistical Areas (MSA)</a:t>
             </a:r>
           </a:p>
         </p:txBody>
@@ -8850,7 +9125,7 @@
           <p:cNvPr id="3" name="Content Placeholder 2">
             <a:extLst>
               <a:ext uri="{FF2B5EF4-FFF2-40B4-BE49-F238E27FC236}">
-                <a16:creationId xmlns:a16="http://schemas.microsoft.com/office/drawing/2014/main" id="{2ED32F58-589C-443E-8734-0A8E035B70D5}"/>
+                <a16:creationId xmlns:a16="http://schemas.microsoft.com/office/drawing/2014/main" id="{E1796F22-021F-49BB-8F18-0D9DD8629605}"/>
               </a:ext>
             </a:extLst>
           </p:cNvPr>
@@ -8870,54 +9145,10 @@
           </a:p>
         </p:txBody>
       </p:sp>
-      <p:pic>
-        <p:nvPicPr>
-          <p:cNvPr id="10" name="Picture 9">
-            <a:extLst>
-              <a:ext uri="{FF2B5EF4-FFF2-40B4-BE49-F238E27FC236}">
-                <a16:creationId xmlns:a16="http://schemas.microsoft.com/office/drawing/2014/main" id="{80ECDEC8-3D8C-473D-A708-3540A96BD7A7}"/>
-              </a:ext>
-            </a:extLst>
-          </p:cNvPr>
-          <p:cNvPicPr>
-            <a:picLocks noChangeAspect="1"/>
-          </p:cNvPicPr>
-          <p:nvPr/>
-        </p:nvPicPr>
-        <p:blipFill>
-          <a:blip r:embed="rId2">
-            <a:duotone>
-              <a:schemeClr val="accent5">
-                <a:shade val="45000"/>
-                <a:satMod val="135000"/>
-              </a:schemeClr>
-              <a:prstClr val="white"/>
-            </a:duotone>
-            <a:alphaModFix/>
-            <a:extLst>
-              <a:ext uri="{28A0092B-C50C-407E-A947-70E740481C1C}">
-                <a14:useLocalDpi xmlns:a14="http://schemas.microsoft.com/office/drawing/2010/main" val="0"/>
-              </a:ext>
-            </a:extLst>
-          </a:blip>
-          <a:stretch>
-            <a:fillRect/>
-          </a:stretch>
-        </p:blipFill>
-        <p:spPr>
-          <a:xfrm>
-            <a:off x="336507" y="5771269"/>
-            <a:ext cx="826446" cy="826446"/>
-          </a:xfrm>
-          <a:prstGeom prst="rect">
-            <a:avLst/>
-          </a:prstGeom>
-        </p:spPr>
-      </p:pic>
     </p:spTree>
     <p:extLst>
       <p:ext uri="{BB962C8B-B14F-4D97-AF65-F5344CB8AC3E}">
-        <p14:creationId xmlns:p14="http://schemas.microsoft.com/office/powerpoint/2010/main" val="16888013"/>
+        <p14:creationId xmlns:p14="http://schemas.microsoft.com/office/powerpoint/2010/main" val="2074632626"/>
       </p:ext>
     </p:extLst>
   </p:cSld>

</xml_diff>